<commit_message>
nvmuldiv: CPU vs. GPU time comparison
</commit_message>
<xml_diff>
--- a/Documents/parallelized_reduce.pptx
+++ b/Documents/parallelized_reduce.pptx
@@ -6,6 +6,7 @@
   </p:sldMasterIdLst>
   <p:sldIdLst>
     <p:sldId id="257" r:id="rId2"/>
+    <p:sldId id="258" r:id="rId3"/>
   </p:sldIdLst>
   <p:sldSz cx="9144000" cy="6858000" type="screen4x3"/>
   <p:notesSz cx="6858000" cy="9144000"/>
@@ -3972,20 +3973,14 @@
             <a:r>
               <a:rPr lang="en-US" sz="1600" dirty="0" smtClean="0">
                 <a:solidFill>
-                  <a:schemeClr val="tx1">
-                    <a:lumMod val="50000"/>
-                    <a:lumOff val="50000"/>
-                  </a:schemeClr>
+                  <a:srgbClr val="A6A6A6"/>
                 </a:solidFill>
               </a:rPr>
               <a:t>5</a:t>
             </a:r>
             <a:endParaRPr lang="en-US" sz="1600" dirty="0">
               <a:solidFill>
-                <a:schemeClr val="tx1">
-                  <a:lumMod val="50000"/>
-                  <a:lumOff val="50000"/>
-                </a:schemeClr>
+                <a:srgbClr val="A6A6A6"/>
               </a:solidFill>
             </a:endParaRPr>
           </a:p>
@@ -4035,20 +4030,14 @@
             <a:r>
               <a:rPr lang="en-US" sz="1600" dirty="0" smtClean="0">
                 <a:solidFill>
-                  <a:schemeClr val="tx1">
-                    <a:lumMod val="50000"/>
-                    <a:lumOff val="50000"/>
-                  </a:schemeClr>
+                  <a:srgbClr val="A6A6A6"/>
                 </a:solidFill>
               </a:rPr>
               <a:t>6</a:t>
             </a:r>
             <a:endParaRPr lang="en-US" sz="1600" dirty="0">
               <a:solidFill>
-                <a:schemeClr val="tx1">
-                  <a:lumMod val="50000"/>
-                  <a:lumOff val="50000"/>
-                </a:schemeClr>
+                <a:srgbClr val="A6A6A6"/>
               </a:solidFill>
             </a:endParaRPr>
           </a:p>
@@ -4098,20 +4087,14 @@
             <a:r>
               <a:rPr lang="en-US" sz="1600" dirty="0" smtClean="0">
                 <a:solidFill>
-                  <a:schemeClr val="tx1">
-                    <a:lumMod val="50000"/>
-                    <a:lumOff val="50000"/>
-                  </a:schemeClr>
+                  <a:srgbClr val="A6A6A6"/>
                 </a:solidFill>
               </a:rPr>
               <a:t>7</a:t>
             </a:r>
             <a:endParaRPr lang="en-US" sz="1600" dirty="0">
               <a:solidFill>
-                <a:schemeClr val="tx1">
-                  <a:lumMod val="50000"/>
-                  <a:lumOff val="50000"/>
-                </a:schemeClr>
+                <a:srgbClr val="A6A6A6"/>
               </a:solidFill>
             </a:endParaRPr>
           </a:p>
@@ -4161,20 +4144,14 @@
             <a:r>
               <a:rPr lang="en-US" sz="1600" dirty="0" smtClean="0">
                 <a:solidFill>
-                  <a:schemeClr val="tx1">
-                    <a:lumMod val="50000"/>
-                    <a:lumOff val="50000"/>
-                  </a:schemeClr>
+                  <a:srgbClr val="A6A6A6"/>
                 </a:solidFill>
               </a:rPr>
               <a:t>8</a:t>
             </a:r>
             <a:endParaRPr lang="en-US" sz="1600" dirty="0">
               <a:solidFill>
-                <a:schemeClr val="tx1">
-                  <a:lumMod val="50000"/>
-                  <a:lumOff val="50000"/>
-                </a:schemeClr>
+                <a:srgbClr val="A6A6A6"/>
               </a:solidFill>
             </a:endParaRPr>
           </a:p>
@@ -4196,7 +4173,7 @@
           </a:prstGeom>
           <a:ln>
             <a:solidFill>
-              <a:srgbClr val="7F7F7F"/>
+              <a:srgbClr val="A6A6A6"/>
             </a:solidFill>
           </a:ln>
         </p:spPr>
@@ -4219,9 +4196,17 @@
           <a:lstStyle/>
           <a:p>
             <a:pPr algn="ctr"/>
+            <a:r>
+              <a:rPr lang="en-US" sz="1600" dirty="0" smtClean="0">
+                <a:solidFill>
+                  <a:srgbClr val="A6A6A6"/>
+                </a:solidFill>
+              </a:rPr>
+              <a:t>21</a:t>
+            </a:r>
             <a:endParaRPr lang="en-US" sz="1600" dirty="0">
               <a:solidFill>
-                <a:srgbClr val="7F7F7F"/>
+                <a:srgbClr val="A6A6A6"/>
               </a:solidFill>
             </a:endParaRPr>
           </a:p>
@@ -4243,7 +4228,7 @@
           </a:prstGeom>
           <a:ln>
             <a:solidFill>
-              <a:srgbClr val="7F7F7F"/>
+              <a:srgbClr val="A6A6A6"/>
             </a:solidFill>
           </a:ln>
         </p:spPr>
@@ -4266,9 +4251,17 @@
           <a:lstStyle/>
           <a:p>
             <a:pPr algn="ctr"/>
+            <a:r>
+              <a:rPr lang="en-US" sz="1600" dirty="0" smtClean="0">
+                <a:solidFill>
+                  <a:srgbClr val="A6A6A6"/>
+                </a:solidFill>
+              </a:rPr>
+              <a:t>32</a:t>
+            </a:r>
             <a:endParaRPr lang="en-US" sz="1600" dirty="0">
               <a:solidFill>
-                <a:srgbClr val="7F7F7F"/>
+                <a:srgbClr val="A6A6A6"/>
               </a:solidFill>
             </a:endParaRPr>
           </a:p>
@@ -4290,7 +4283,7 @@
           </a:prstGeom>
           <a:ln>
             <a:solidFill>
-              <a:srgbClr val="7F7F7F"/>
+              <a:srgbClr val="A6A6A6"/>
             </a:solidFill>
           </a:ln>
         </p:spPr>
@@ -4316,14 +4309,14 @@
             <a:r>
               <a:rPr lang="en-US" sz="1600" dirty="0" smtClean="0">
                 <a:solidFill>
-                  <a:srgbClr val="7F7F7F"/>
+                  <a:srgbClr val="A6A6A6"/>
                 </a:solidFill>
               </a:rPr>
               <a:t>5</a:t>
             </a:r>
             <a:endParaRPr lang="en-US" sz="1600" dirty="0">
               <a:solidFill>
-                <a:srgbClr val="7F7F7F"/>
+                <a:srgbClr val="A6A6A6"/>
               </a:solidFill>
             </a:endParaRPr>
           </a:p>
@@ -4345,7 +4338,7 @@
           </a:prstGeom>
           <a:ln>
             <a:solidFill>
-              <a:srgbClr val="7F7F7F"/>
+              <a:srgbClr val="A6A6A6"/>
             </a:solidFill>
           </a:ln>
         </p:spPr>
@@ -4371,14 +4364,14 @@
             <a:r>
               <a:rPr lang="en-US" sz="1600" dirty="0" smtClean="0">
                 <a:solidFill>
-                  <a:srgbClr val="7F7F7F"/>
+                  <a:srgbClr val="A6A6A6"/>
                 </a:solidFill>
               </a:rPr>
               <a:t>6</a:t>
             </a:r>
             <a:endParaRPr lang="en-US" sz="1600" dirty="0">
               <a:solidFill>
-                <a:srgbClr val="7F7F7F"/>
+                <a:srgbClr val="A6A6A6"/>
               </a:solidFill>
             </a:endParaRPr>
           </a:p>
@@ -4400,7 +4393,7 @@
           </a:prstGeom>
           <a:ln>
             <a:solidFill>
-              <a:srgbClr val="7F7F7F"/>
+              <a:srgbClr val="A6A6A6"/>
             </a:solidFill>
           </a:ln>
         </p:spPr>
@@ -4426,14 +4419,14 @@
             <a:r>
               <a:rPr lang="en-US" sz="1600" dirty="0" smtClean="0">
                 <a:solidFill>
-                  <a:srgbClr val="7F7F7F"/>
+                  <a:srgbClr val="A6A6A6"/>
                 </a:solidFill>
               </a:rPr>
               <a:t>7</a:t>
             </a:r>
             <a:endParaRPr lang="en-US" sz="1600" dirty="0">
               <a:solidFill>
-                <a:srgbClr val="7F7F7F"/>
+                <a:srgbClr val="A6A6A6"/>
               </a:solidFill>
             </a:endParaRPr>
           </a:p>
@@ -4455,7 +4448,7 @@
           </a:prstGeom>
           <a:ln>
             <a:solidFill>
-              <a:srgbClr val="7F7F7F"/>
+              <a:srgbClr val="A6A6A6"/>
             </a:solidFill>
           </a:ln>
         </p:spPr>
@@ -4481,14 +4474,14 @@
             <a:r>
               <a:rPr lang="en-US" sz="1600" dirty="0" smtClean="0">
                 <a:solidFill>
-                  <a:srgbClr val="7F7F7F"/>
+                  <a:srgbClr val="A6A6A6"/>
                 </a:solidFill>
               </a:rPr>
               <a:t>8</a:t>
             </a:r>
             <a:endParaRPr lang="en-US" sz="1600" dirty="0">
               <a:solidFill>
-                <a:srgbClr val="7F7F7F"/>
+                <a:srgbClr val="A6A6A6"/>
               </a:solidFill>
             </a:endParaRPr>
           </a:p>
@@ -4510,7 +4503,7 @@
           </a:prstGeom>
           <a:ln>
             <a:solidFill>
-              <a:srgbClr val="7F7F7F"/>
+              <a:srgbClr val="A6A6A6"/>
             </a:solidFill>
           </a:ln>
         </p:spPr>
@@ -4533,9 +4526,17 @@
           <a:lstStyle/>
           <a:p>
             <a:pPr algn="ctr"/>
+            <a:r>
+              <a:rPr lang="en-US" sz="1600" dirty="0" smtClean="0">
+                <a:solidFill>
+                  <a:srgbClr val="A6A6A6"/>
+                </a:solidFill>
+              </a:rPr>
+              <a:t>21</a:t>
+            </a:r>
             <a:endParaRPr lang="en-US" sz="1600" dirty="0">
               <a:solidFill>
-                <a:srgbClr val="7F7F7F"/>
+                <a:srgbClr val="A6A6A6"/>
               </a:solidFill>
             </a:endParaRPr>
           </a:p>
@@ -4557,7 +4558,7 @@
           </a:prstGeom>
           <a:ln>
             <a:solidFill>
-              <a:srgbClr val="7F7F7F"/>
+              <a:srgbClr val="A6A6A6"/>
             </a:solidFill>
           </a:ln>
         </p:spPr>
@@ -4580,9 +4581,17 @@
           <a:lstStyle/>
           <a:p>
             <a:pPr algn="ctr"/>
+            <a:r>
+              <a:rPr lang="en-US" sz="1600" dirty="0" smtClean="0">
+                <a:solidFill>
+                  <a:srgbClr val="A6A6A6"/>
+                </a:solidFill>
+              </a:rPr>
+              <a:t>32</a:t>
+            </a:r>
             <a:endParaRPr lang="en-US" sz="1600" dirty="0">
               <a:solidFill>
-                <a:srgbClr val="7F7F7F"/>
+                <a:srgbClr val="A6A6A6"/>
               </a:solidFill>
             </a:endParaRPr>
           </a:p>
@@ -4604,7 +4613,7 @@
           </a:prstGeom>
           <a:ln>
             <a:solidFill>
-              <a:srgbClr val="7F7F7F"/>
+              <a:srgbClr val="A6A6A6"/>
             </a:solidFill>
           </a:ln>
         </p:spPr>
@@ -4630,14 +4639,14 @@
             <a:r>
               <a:rPr lang="en-US" sz="1600" dirty="0" smtClean="0">
                 <a:solidFill>
-                  <a:srgbClr val="7F7F7F"/>
+                  <a:srgbClr val="A6A6A6"/>
                 </a:solidFill>
               </a:rPr>
               <a:t>5</a:t>
             </a:r>
             <a:endParaRPr lang="en-US" sz="1600" dirty="0">
               <a:solidFill>
-                <a:srgbClr val="7F7F7F"/>
+                <a:srgbClr val="A6A6A6"/>
               </a:solidFill>
             </a:endParaRPr>
           </a:p>
@@ -4659,7 +4668,7 @@
           </a:prstGeom>
           <a:ln>
             <a:solidFill>
-              <a:srgbClr val="7F7F7F"/>
+              <a:srgbClr val="A6A6A6"/>
             </a:solidFill>
           </a:ln>
         </p:spPr>
@@ -4685,14 +4694,14 @@
             <a:r>
               <a:rPr lang="en-US" sz="1600" dirty="0" smtClean="0">
                 <a:solidFill>
-                  <a:srgbClr val="7F7F7F"/>
+                  <a:srgbClr val="A6A6A6"/>
                 </a:solidFill>
               </a:rPr>
               <a:t>6</a:t>
             </a:r>
             <a:endParaRPr lang="en-US" sz="1600" dirty="0">
               <a:solidFill>
-                <a:srgbClr val="7F7F7F"/>
+                <a:srgbClr val="A6A6A6"/>
               </a:solidFill>
             </a:endParaRPr>
           </a:p>
@@ -4714,7 +4723,7 @@
           </a:prstGeom>
           <a:ln>
             <a:solidFill>
-              <a:srgbClr val="7F7F7F"/>
+              <a:srgbClr val="A6A6A6"/>
             </a:solidFill>
           </a:ln>
         </p:spPr>
@@ -4740,14 +4749,14 @@
             <a:r>
               <a:rPr lang="en-US" sz="1600" dirty="0" smtClean="0">
                 <a:solidFill>
-                  <a:srgbClr val="7F7F7F"/>
+                  <a:srgbClr val="A6A6A6"/>
                 </a:solidFill>
               </a:rPr>
               <a:t>7</a:t>
             </a:r>
             <a:endParaRPr lang="en-US" sz="1600" dirty="0">
               <a:solidFill>
-                <a:srgbClr val="7F7F7F"/>
+                <a:srgbClr val="A6A6A6"/>
               </a:solidFill>
             </a:endParaRPr>
           </a:p>
@@ -4769,7 +4778,7 @@
           </a:prstGeom>
           <a:ln>
             <a:solidFill>
-              <a:srgbClr val="7F7F7F"/>
+              <a:srgbClr val="A6A6A6"/>
             </a:solidFill>
           </a:ln>
         </p:spPr>
@@ -4795,14 +4804,14 @@
             <a:r>
               <a:rPr lang="en-US" sz="1600" dirty="0" smtClean="0">
                 <a:solidFill>
-                  <a:srgbClr val="7F7F7F"/>
+                  <a:srgbClr val="A6A6A6"/>
                 </a:solidFill>
               </a:rPr>
               <a:t>8</a:t>
             </a:r>
             <a:endParaRPr lang="en-US" sz="1600" dirty="0">
               <a:solidFill>
-                <a:srgbClr val="7F7F7F"/>
+                <a:srgbClr val="A6A6A6"/>
               </a:solidFill>
             </a:endParaRPr>
           </a:p>
@@ -4824,7 +4833,7 @@
           </a:prstGeom>
           <a:ln>
             <a:solidFill>
-              <a:srgbClr val="7F7F7F"/>
+              <a:srgbClr val="A6A6A6"/>
             </a:solidFill>
           </a:ln>
         </p:spPr>
@@ -4847,9 +4856,17 @@
           <a:lstStyle/>
           <a:p>
             <a:pPr algn="ctr"/>
+            <a:r>
+              <a:rPr lang="en-US" sz="1600" dirty="0" smtClean="0">
+                <a:solidFill>
+                  <a:srgbClr val="A6A6A6"/>
+                </a:solidFill>
+              </a:rPr>
+              <a:t>384</a:t>
+            </a:r>
             <a:endParaRPr lang="en-US" sz="1600" dirty="0">
               <a:solidFill>
-                <a:srgbClr val="7F7F7F"/>
+                <a:srgbClr val="A6A6A6"/>
               </a:solidFill>
             </a:endParaRPr>
           </a:p>
@@ -5532,6 +5549,2802 @@
   <p:clrMapOvr>
     <a:masterClrMapping/>
   </p:clrMapOvr>
+  <p:timing>
+    <p:tnLst>
+      <p:par>
+        <p:cTn xmlns:p14="http://schemas.microsoft.com/office/powerpoint/2010/main" id="1" dur="indefinite" restart="never" nodeType="tmRoot"/>
+      </p:par>
+    </p:tnLst>
+  </p:timing>
+</p:sld>
+</file>
+
+<file path=ppt/slides/slide2.xml><?xml version="1.0" encoding="utf-8"?>
+<p:sld xmlns:a="http://schemas.openxmlformats.org/drawingml/2006/main" xmlns:r="http://schemas.openxmlformats.org/officeDocument/2006/relationships" xmlns:p="http://schemas.openxmlformats.org/presentationml/2006/main">
+  <p:cSld>
+    <p:spTree>
+      <p:nvGrpSpPr>
+        <p:cNvPr id="1" name=""/>
+        <p:cNvGrpSpPr/>
+        <p:nvPr/>
+      </p:nvGrpSpPr>
+      <p:grpSpPr>
+        <a:xfrm>
+          <a:off x="0" y="0"/>
+          <a:ext cx="0" cy="0"/>
+          <a:chOff x="0" y="0"/>
+          <a:chExt cx="0" cy="0"/>
+        </a:xfrm>
+      </p:grpSpPr>
+      <p:sp>
+        <p:nvSpPr>
+          <p:cNvPr id="18" name="Rectangle 17"/>
+          <p:cNvSpPr/>
+          <p:nvPr/>
+        </p:nvSpPr>
+        <p:spPr>
+          <a:xfrm>
+            <a:off x="1585443" y="3039733"/>
+            <a:ext cx="5243332" cy="3224837"/>
+          </a:xfrm>
+          <a:prstGeom prst="rect">
+            <a:avLst/>
+          </a:prstGeom>
+        </p:spPr>
+        <p:style>
+          <a:lnRef idx="1">
+            <a:schemeClr val="accent2"/>
+          </a:lnRef>
+          <a:fillRef idx="3">
+            <a:schemeClr val="accent2"/>
+          </a:fillRef>
+          <a:effectRef idx="2">
+            <a:schemeClr val="accent2"/>
+          </a:effectRef>
+          <a:fontRef idx="minor">
+            <a:schemeClr val="lt1"/>
+          </a:fontRef>
+        </p:style>
+        <p:txBody>
+          <a:bodyPr rtlCol="0" anchor="ctr"/>
+          <a:lstStyle/>
+          <a:p>
+            <a:pPr algn="ctr"/>
+            <a:endParaRPr lang="en-US"/>
+          </a:p>
+        </p:txBody>
+      </p:sp>
+      <p:sp>
+        <p:nvSpPr>
+          <p:cNvPr id="82" name="Rectangle 81"/>
+          <p:cNvSpPr/>
+          <p:nvPr/>
+        </p:nvSpPr>
+        <p:spPr>
+          <a:xfrm>
+            <a:off x="2613845" y="1417638"/>
+            <a:ext cx="720650" cy="3734023"/>
+          </a:xfrm>
+          <a:prstGeom prst="rect">
+            <a:avLst/>
+          </a:prstGeom>
+          <a:solidFill>
+            <a:schemeClr val="tx2">
+              <a:lumMod val="20000"/>
+              <a:lumOff val="80000"/>
+              <a:alpha val="50000"/>
+            </a:schemeClr>
+          </a:solidFill>
+        </p:spPr>
+        <p:style>
+          <a:lnRef idx="1">
+            <a:schemeClr val="accent1"/>
+          </a:lnRef>
+          <a:fillRef idx="3">
+            <a:schemeClr val="accent1"/>
+          </a:fillRef>
+          <a:effectRef idx="2">
+            <a:schemeClr val="accent1"/>
+          </a:effectRef>
+          <a:fontRef idx="minor">
+            <a:schemeClr val="lt1"/>
+          </a:fontRef>
+        </p:style>
+        <p:txBody>
+          <a:bodyPr rtlCol="0" anchor="ctr"/>
+          <a:lstStyle/>
+          <a:p>
+            <a:pPr algn="ctr"/>
+            <a:endParaRPr lang="en-US"/>
+          </a:p>
+        </p:txBody>
+      </p:sp>
+      <p:sp>
+        <p:nvSpPr>
+          <p:cNvPr id="81" name="Rectangle 80"/>
+          <p:cNvSpPr/>
+          <p:nvPr/>
+        </p:nvSpPr>
+        <p:spPr>
+          <a:xfrm>
+            <a:off x="1752454" y="1417638"/>
+            <a:ext cx="720650" cy="4719248"/>
+          </a:xfrm>
+          <a:prstGeom prst="rect">
+            <a:avLst/>
+          </a:prstGeom>
+          <a:solidFill>
+            <a:schemeClr val="tx2">
+              <a:lumMod val="20000"/>
+              <a:lumOff val="80000"/>
+              <a:alpha val="50000"/>
+            </a:schemeClr>
+          </a:solidFill>
+        </p:spPr>
+        <p:style>
+          <a:lnRef idx="1">
+            <a:schemeClr val="accent1"/>
+          </a:lnRef>
+          <a:fillRef idx="3">
+            <a:schemeClr val="accent1"/>
+          </a:fillRef>
+          <a:effectRef idx="2">
+            <a:schemeClr val="accent1"/>
+          </a:effectRef>
+          <a:fontRef idx="minor">
+            <a:schemeClr val="lt1"/>
+          </a:fontRef>
+        </p:style>
+        <p:txBody>
+          <a:bodyPr rtlCol="0" anchor="ctr"/>
+          <a:lstStyle/>
+          <a:p>
+            <a:pPr algn="ctr"/>
+            <a:endParaRPr lang="en-US"/>
+          </a:p>
+        </p:txBody>
+      </p:sp>
+      <p:sp>
+        <p:nvSpPr>
+          <p:cNvPr id="83" name="Rectangle 82"/>
+          <p:cNvSpPr/>
+          <p:nvPr/>
+        </p:nvSpPr>
+        <p:spPr>
+          <a:xfrm>
+            <a:off x="3460822" y="1417810"/>
+            <a:ext cx="720650" cy="2629924"/>
+          </a:xfrm>
+          <a:prstGeom prst="rect">
+            <a:avLst/>
+          </a:prstGeom>
+          <a:solidFill>
+            <a:schemeClr val="tx2">
+              <a:lumMod val="20000"/>
+              <a:lumOff val="80000"/>
+              <a:alpha val="50000"/>
+            </a:schemeClr>
+          </a:solidFill>
+        </p:spPr>
+        <p:style>
+          <a:lnRef idx="1">
+            <a:schemeClr val="accent1"/>
+          </a:lnRef>
+          <a:fillRef idx="3">
+            <a:schemeClr val="accent1"/>
+          </a:fillRef>
+          <a:effectRef idx="2">
+            <a:schemeClr val="accent1"/>
+          </a:effectRef>
+          <a:fontRef idx="minor">
+            <a:schemeClr val="lt1"/>
+          </a:fontRef>
+        </p:style>
+        <p:txBody>
+          <a:bodyPr rtlCol="0" anchor="ctr"/>
+          <a:lstStyle/>
+          <a:p>
+            <a:pPr algn="ctr"/>
+            <a:endParaRPr lang="en-US"/>
+          </a:p>
+        </p:txBody>
+      </p:sp>
+      <p:sp>
+        <p:nvSpPr>
+          <p:cNvPr id="84" name="Rectangle 83"/>
+          <p:cNvSpPr/>
+          <p:nvPr/>
+        </p:nvSpPr>
+        <p:spPr>
+          <a:xfrm>
+            <a:off x="4332387" y="1417810"/>
+            <a:ext cx="720650" cy="2629923"/>
+          </a:xfrm>
+          <a:prstGeom prst="rect">
+            <a:avLst/>
+          </a:prstGeom>
+          <a:solidFill>
+            <a:schemeClr val="tx2">
+              <a:lumMod val="20000"/>
+              <a:lumOff val="80000"/>
+              <a:alpha val="50000"/>
+            </a:schemeClr>
+          </a:solidFill>
+        </p:spPr>
+        <p:style>
+          <a:lnRef idx="1">
+            <a:schemeClr val="accent1"/>
+          </a:lnRef>
+          <a:fillRef idx="3">
+            <a:schemeClr val="accent1"/>
+          </a:fillRef>
+          <a:effectRef idx="2">
+            <a:schemeClr val="accent1"/>
+          </a:effectRef>
+          <a:fontRef idx="minor">
+            <a:schemeClr val="lt1"/>
+          </a:fontRef>
+        </p:style>
+        <p:txBody>
+          <a:bodyPr rtlCol="0" anchor="ctr"/>
+          <a:lstStyle/>
+          <a:p>
+            <a:pPr algn="ctr"/>
+            <a:endParaRPr lang="en-US"/>
+          </a:p>
+        </p:txBody>
+      </p:sp>
+      <p:sp>
+        <p:nvSpPr>
+          <p:cNvPr id="2" name="Title 1"/>
+          <p:cNvSpPr>
+            <a:spLocks noGrp="1"/>
+          </p:cNvSpPr>
+          <p:nvPr>
+            <p:ph type="title"/>
+          </p:nvPr>
+        </p:nvSpPr>
+        <p:spPr/>
+        <p:txBody>
+          <a:bodyPr/>
+          <a:lstStyle/>
+          <a:p>
+            <a:r>
+              <a:rPr lang="en-US" dirty="0" smtClean="0"/>
+              <a:t>Parallelized Reduce</a:t>
+            </a:r>
+            <a:endParaRPr lang="en-US" dirty="0"/>
+          </a:p>
+        </p:txBody>
+      </p:sp>
+      <p:sp>
+        <p:nvSpPr>
+          <p:cNvPr id="6" name="Rectangle 5"/>
+          <p:cNvSpPr/>
+          <p:nvPr/>
+        </p:nvSpPr>
+        <p:spPr>
+          <a:xfrm>
+            <a:off x="1804171" y="2064717"/>
+            <a:ext cx="617216" cy="617216"/>
+          </a:xfrm>
+          <a:prstGeom prst="rect">
+            <a:avLst/>
+          </a:prstGeom>
+        </p:spPr>
+        <p:style>
+          <a:lnRef idx="2">
+            <a:schemeClr val="accent1"/>
+          </a:lnRef>
+          <a:fillRef idx="1">
+            <a:schemeClr val="lt1"/>
+          </a:fillRef>
+          <a:effectRef idx="0">
+            <a:schemeClr val="accent1"/>
+          </a:effectRef>
+          <a:fontRef idx="minor">
+            <a:schemeClr val="dk1"/>
+          </a:fontRef>
+        </p:style>
+        <p:txBody>
+          <a:bodyPr rtlCol="0" anchor="ctr"/>
+          <a:lstStyle/>
+          <a:p>
+            <a:pPr algn="ctr"/>
+            <a:r>
+              <a:rPr lang="en-US" sz="1600" dirty="0" smtClean="0"/>
+              <a:t>1</a:t>
+            </a:r>
+            <a:endParaRPr lang="en-US" sz="1600" dirty="0"/>
+          </a:p>
+        </p:txBody>
+      </p:sp>
+      <p:sp>
+        <p:nvSpPr>
+          <p:cNvPr id="7" name="Rectangle 6"/>
+          <p:cNvSpPr/>
+          <p:nvPr/>
+        </p:nvSpPr>
+        <p:spPr>
+          <a:xfrm>
+            <a:off x="2665561" y="2064717"/>
+            <a:ext cx="617216" cy="617216"/>
+          </a:xfrm>
+          <a:prstGeom prst="rect">
+            <a:avLst/>
+          </a:prstGeom>
+        </p:spPr>
+        <p:style>
+          <a:lnRef idx="2">
+            <a:schemeClr val="accent2"/>
+          </a:lnRef>
+          <a:fillRef idx="1">
+            <a:schemeClr val="lt1"/>
+          </a:fillRef>
+          <a:effectRef idx="0">
+            <a:schemeClr val="accent2"/>
+          </a:effectRef>
+          <a:fontRef idx="minor">
+            <a:schemeClr val="dk1"/>
+          </a:fontRef>
+        </p:style>
+        <p:txBody>
+          <a:bodyPr rtlCol="0" anchor="ctr"/>
+          <a:lstStyle/>
+          <a:p>
+            <a:pPr algn="ctr"/>
+            <a:r>
+              <a:rPr lang="en-US" sz="1600" dirty="0" smtClean="0"/>
+              <a:t>2</a:t>
+            </a:r>
+            <a:endParaRPr lang="en-US" sz="1600" dirty="0"/>
+          </a:p>
+        </p:txBody>
+      </p:sp>
+      <p:sp>
+        <p:nvSpPr>
+          <p:cNvPr id="8" name="Rectangle 7"/>
+          <p:cNvSpPr/>
+          <p:nvPr/>
+        </p:nvSpPr>
+        <p:spPr>
+          <a:xfrm>
+            <a:off x="3526951" y="2064717"/>
+            <a:ext cx="617216" cy="617216"/>
+          </a:xfrm>
+          <a:prstGeom prst="rect">
+            <a:avLst/>
+          </a:prstGeom>
+        </p:spPr>
+        <p:style>
+          <a:lnRef idx="2">
+            <a:schemeClr val="dk1"/>
+          </a:lnRef>
+          <a:fillRef idx="1">
+            <a:schemeClr val="lt1"/>
+          </a:fillRef>
+          <a:effectRef idx="0">
+            <a:schemeClr val="dk1"/>
+          </a:effectRef>
+          <a:fontRef idx="minor">
+            <a:schemeClr val="dk1"/>
+          </a:fontRef>
+        </p:style>
+        <p:txBody>
+          <a:bodyPr rtlCol="0" anchor="ctr"/>
+          <a:lstStyle/>
+          <a:p>
+            <a:pPr algn="ctr"/>
+            <a:r>
+              <a:rPr lang="en-US" sz="1600" dirty="0" smtClean="0"/>
+              <a:t>3</a:t>
+            </a:r>
+            <a:endParaRPr lang="en-US" sz="1600" dirty="0"/>
+          </a:p>
+        </p:txBody>
+      </p:sp>
+      <p:sp>
+        <p:nvSpPr>
+          <p:cNvPr id="9" name="Rectangle 8"/>
+          <p:cNvSpPr/>
+          <p:nvPr/>
+        </p:nvSpPr>
+        <p:spPr>
+          <a:xfrm>
+            <a:off x="4388341" y="2064717"/>
+            <a:ext cx="617216" cy="617216"/>
+          </a:xfrm>
+          <a:prstGeom prst="rect">
+            <a:avLst/>
+          </a:prstGeom>
+        </p:spPr>
+        <p:style>
+          <a:lnRef idx="2">
+            <a:schemeClr val="dk1"/>
+          </a:lnRef>
+          <a:fillRef idx="1">
+            <a:schemeClr val="lt1"/>
+          </a:fillRef>
+          <a:effectRef idx="0">
+            <a:schemeClr val="dk1"/>
+          </a:effectRef>
+          <a:fontRef idx="minor">
+            <a:schemeClr val="dk1"/>
+          </a:fontRef>
+        </p:style>
+        <p:txBody>
+          <a:bodyPr rtlCol="0" anchor="ctr"/>
+          <a:lstStyle/>
+          <a:p>
+            <a:pPr algn="ctr"/>
+            <a:r>
+              <a:rPr lang="en-US" sz="1600" dirty="0" smtClean="0"/>
+              <a:t>4</a:t>
+            </a:r>
+            <a:endParaRPr lang="en-US" sz="1600" dirty="0"/>
+          </a:p>
+        </p:txBody>
+      </p:sp>
+      <p:sp>
+        <p:nvSpPr>
+          <p:cNvPr id="10" name="Rectangle 9"/>
+          <p:cNvSpPr/>
+          <p:nvPr/>
+        </p:nvSpPr>
+        <p:spPr>
+          <a:xfrm>
+            <a:off x="5249731" y="2064717"/>
+            <a:ext cx="617216" cy="617216"/>
+          </a:xfrm>
+          <a:prstGeom prst="rect">
+            <a:avLst/>
+          </a:prstGeom>
+        </p:spPr>
+        <p:style>
+          <a:lnRef idx="2">
+            <a:schemeClr val="accent1"/>
+          </a:lnRef>
+          <a:fillRef idx="1">
+            <a:schemeClr val="lt1"/>
+          </a:fillRef>
+          <a:effectRef idx="0">
+            <a:schemeClr val="accent1"/>
+          </a:effectRef>
+          <a:fontRef idx="minor">
+            <a:schemeClr val="dk1"/>
+          </a:fontRef>
+        </p:style>
+        <p:txBody>
+          <a:bodyPr rtlCol="0" anchor="ctr"/>
+          <a:lstStyle/>
+          <a:p>
+            <a:pPr algn="ctr"/>
+            <a:r>
+              <a:rPr lang="en-US" sz="1600" dirty="0" smtClean="0"/>
+              <a:t>5</a:t>
+            </a:r>
+            <a:endParaRPr lang="en-US" sz="1600" dirty="0"/>
+          </a:p>
+        </p:txBody>
+      </p:sp>
+      <p:sp>
+        <p:nvSpPr>
+          <p:cNvPr id="11" name="Rectangle 10"/>
+          <p:cNvSpPr/>
+          <p:nvPr/>
+        </p:nvSpPr>
+        <p:spPr>
+          <a:xfrm>
+            <a:off x="6111121" y="2064717"/>
+            <a:ext cx="617216" cy="617216"/>
+          </a:xfrm>
+          <a:prstGeom prst="rect">
+            <a:avLst/>
+          </a:prstGeom>
+        </p:spPr>
+        <p:style>
+          <a:lnRef idx="2">
+            <a:schemeClr val="accent2"/>
+          </a:lnRef>
+          <a:fillRef idx="1">
+            <a:schemeClr val="lt1"/>
+          </a:fillRef>
+          <a:effectRef idx="0">
+            <a:schemeClr val="accent2"/>
+          </a:effectRef>
+          <a:fontRef idx="minor">
+            <a:schemeClr val="dk1"/>
+          </a:fontRef>
+        </p:style>
+        <p:txBody>
+          <a:bodyPr rtlCol="0" anchor="ctr"/>
+          <a:lstStyle/>
+          <a:p>
+            <a:pPr algn="ctr"/>
+            <a:r>
+              <a:rPr lang="en-US" sz="1600" dirty="0" smtClean="0"/>
+              <a:t>6</a:t>
+            </a:r>
+            <a:endParaRPr lang="en-US" sz="1600" dirty="0"/>
+          </a:p>
+        </p:txBody>
+      </p:sp>
+      <p:sp>
+        <p:nvSpPr>
+          <p:cNvPr id="12" name="Rectangle 11"/>
+          <p:cNvSpPr/>
+          <p:nvPr/>
+        </p:nvSpPr>
+        <p:spPr>
+          <a:xfrm>
+            <a:off x="6972511" y="2064717"/>
+            <a:ext cx="617216" cy="617216"/>
+          </a:xfrm>
+          <a:prstGeom prst="rect">
+            <a:avLst/>
+          </a:prstGeom>
+        </p:spPr>
+        <p:style>
+          <a:lnRef idx="2">
+            <a:schemeClr val="dk1"/>
+          </a:lnRef>
+          <a:fillRef idx="1">
+            <a:schemeClr val="lt1"/>
+          </a:fillRef>
+          <a:effectRef idx="0">
+            <a:schemeClr val="dk1"/>
+          </a:effectRef>
+          <a:fontRef idx="minor">
+            <a:schemeClr val="dk1"/>
+          </a:fontRef>
+        </p:style>
+        <p:txBody>
+          <a:bodyPr rtlCol="0" anchor="ctr"/>
+          <a:lstStyle/>
+          <a:p>
+            <a:pPr algn="ctr"/>
+            <a:r>
+              <a:rPr lang="en-US" sz="1600" dirty="0" smtClean="0"/>
+              <a:t>7</a:t>
+            </a:r>
+            <a:endParaRPr lang="en-US" sz="1600" dirty="0"/>
+          </a:p>
+        </p:txBody>
+      </p:sp>
+      <p:sp>
+        <p:nvSpPr>
+          <p:cNvPr id="13" name="Rectangle 12"/>
+          <p:cNvSpPr/>
+          <p:nvPr/>
+        </p:nvSpPr>
+        <p:spPr>
+          <a:xfrm>
+            <a:off x="7833899" y="2064717"/>
+            <a:ext cx="617216" cy="617216"/>
+          </a:xfrm>
+          <a:prstGeom prst="rect">
+            <a:avLst/>
+          </a:prstGeom>
+        </p:spPr>
+        <p:style>
+          <a:lnRef idx="2">
+            <a:schemeClr val="dk1"/>
+          </a:lnRef>
+          <a:fillRef idx="1">
+            <a:schemeClr val="lt1"/>
+          </a:fillRef>
+          <a:effectRef idx="0">
+            <a:schemeClr val="dk1"/>
+          </a:effectRef>
+          <a:fontRef idx="minor">
+            <a:schemeClr val="dk1"/>
+          </a:fontRef>
+        </p:style>
+        <p:txBody>
+          <a:bodyPr rtlCol="0" anchor="ctr"/>
+          <a:lstStyle/>
+          <a:p>
+            <a:pPr algn="ctr"/>
+            <a:r>
+              <a:rPr lang="en-US" sz="1600" dirty="0" smtClean="0"/>
+              <a:t>8</a:t>
+            </a:r>
+            <a:endParaRPr lang="en-US" sz="1600" dirty="0"/>
+          </a:p>
+        </p:txBody>
+      </p:sp>
+      <p:sp>
+        <p:nvSpPr>
+          <p:cNvPr id="14" name="Rectangle 13"/>
+          <p:cNvSpPr/>
+          <p:nvPr/>
+        </p:nvSpPr>
+        <p:spPr>
+          <a:xfrm>
+            <a:off x="1804171" y="3168331"/>
+            <a:ext cx="617216" cy="617216"/>
+          </a:xfrm>
+          <a:prstGeom prst="rect">
+            <a:avLst/>
+          </a:prstGeom>
+        </p:spPr>
+        <p:style>
+          <a:lnRef idx="2">
+            <a:schemeClr val="accent1"/>
+          </a:lnRef>
+          <a:fillRef idx="1">
+            <a:schemeClr val="lt1"/>
+          </a:fillRef>
+          <a:effectRef idx="0">
+            <a:schemeClr val="accent1"/>
+          </a:effectRef>
+          <a:fontRef idx="minor">
+            <a:schemeClr val="dk1"/>
+          </a:fontRef>
+        </p:style>
+        <p:txBody>
+          <a:bodyPr rtlCol="0" anchor="ctr"/>
+          <a:lstStyle/>
+          <a:p>
+            <a:pPr algn="ctr"/>
+            <a:r>
+              <a:rPr lang="en-US" sz="1600" dirty="0" smtClean="0"/>
+              <a:t>5</a:t>
+            </a:r>
+            <a:endParaRPr lang="en-US" sz="1600" dirty="0"/>
+          </a:p>
+        </p:txBody>
+      </p:sp>
+      <p:sp>
+        <p:nvSpPr>
+          <p:cNvPr id="15" name="Rectangle 14"/>
+          <p:cNvSpPr/>
+          <p:nvPr/>
+        </p:nvSpPr>
+        <p:spPr>
+          <a:xfrm>
+            <a:off x="2665561" y="3168331"/>
+            <a:ext cx="617216" cy="617216"/>
+          </a:xfrm>
+          <a:prstGeom prst="rect">
+            <a:avLst/>
+          </a:prstGeom>
+        </p:spPr>
+        <p:style>
+          <a:lnRef idx="2">
+            <a:schemeClr val="accent2"/>
+          </a:lnRef>
+          <a:fillRef idx="1">
+            <a:schemeClr val="lt1"/>
+          </a:fillRef>
+          <a:effectRef idx="0">
+            <a:schemeClr val="accent2"/>
+          </a:effectRef>
+          <a:fontRef idx="minor">
+            <a:schemeClr val="dk1"/>
+          </a:fontRef>
+        </p:style>
+        <p:txBody>
+          <a:bodyPr rtlCol="0" anchor="ctr"/>
+          <a:lstStyle/>
+          <a:p>
+            <a:pPr algn="ctr"/>
+            <a:r>
+              <a:rPr lang="en-US" sz="1600" dirty="0" smtClean="0"/>
+              <a:t>12</a:t>
+            </a:r>
+            <a:endParaRPr lang="en-US" sz="1600" dirty="0"/>
+          </a:p>
+        </p:txBody>
+      </p:sp>
+      <p:sp>
+        <p:nvSpPr>
+          <p:cNvPr id="16" name="Rectangle 15"/>
+          <p:cNvSpPr/>
+          <p:nvPr/>
+        </p:nvSpPr>
+        <p:spPr>
+          <a:xfrm>
+            <a:off x="3526951" y="3172061"/>
+            <a:ext cx="617216" cy="617216"/>
+          </a:xfrm>
+          <a:prstGeom prst="rect">
+            <a:avLst/>
+          </a:prstGeom>
+        </p:spPr>
+        <p:style>
+          <a:lnRef idx="2">
+            <a:schemeClr val="dk1"/>
+          </a:lnRef>
+          <a:fillRef idx="1">
+            <a:schemeClr val="lt1"/>
+          </a:fillRef>
+          <a:effectRef idx="0">
+            <a:schemeClr val="dk1"/>
+          </a:effectRef>
+          <a:fontRef idx="minor">
+            <a:schemeClr val="dk1"/>
+          </a:fontRef>
+        </p:style>
+        <p:txBody>
+          <a:bodyPr rtlCol="0" anchor="ctr"/>
+          <a:lstStyle/>
+          <a:p>
+            <a:pPr algn="ctr"/>
+            <a:r>
+              <a:rPr lang="en-US" sz="1600" dirty="0" smtClean="0"/>
+              <a:t>21</a:t>
+            </a:r>
+            <a:endParaRPr lang="en-US" sz="1600" dirty="0"/>
+          </a:p>
+        </p:txBody>
+      </p:sp>
+      <p:sp>
+        <p:nvSpPr>
+          <p:cNvPr id="17" name="Rectangle 16"/>
+          <p:cNvSpPr/>
+          <p:nvPr/>
+        </p:nvSpPr>
+        <p:spPr>
+          <a:xfrm>
+            <a:off x="4388341" y="3172061"/>
+            <a:ext cx="617216" cy="617216"/>
+          </a:xfrm>
+          <a:prstGeom prst="rect">
+            <a:avLst/>
+          </a:prstGeom>
+        </p:spPr>
+        <p:style>
+          <a:lnRef idx="2">
+            <a:schemeClr val="accent2"/>
+          </a:lnRef>
+          <a:fillRef idx="1">
+            <a:schemeClr val="lt1"/>
+          </a:fillRef>
+          <a:effectRef idx="0">
+            <a:schemeClr val="accent2"/>
+          </a:effectRef>
+          <a:fontRef idx="minor">
+            <a:schemeClr val="dk1"/>
+          </a:fontRef>
+        </p:style>
+        <p:txBody>
+          <a:bodyPr rtlCol="0" anchor="ctr"/>
+          <a:lstStyle/>
+          <a:p>
+            <a:pPr algn="ctr"/>
+            <a:r>
+              <a:rPr lang="en-US" sz="1600" dirty="0" smtClean="0"/>
+              <a:t>32</a:t>
+            </a:r>
+            <a:endParaRPr lang="en-US" sz="1600" dirty="0"/>
+          </a:p>
+        </p:txBody>
+      </p:sp>
+      <p:sp>
+        <p:nvSpPr>
+          <p:cNvPr id="35" name="Rectangle 34"/>
+          <p:cNvSpPr/>
+          <p:nvPr/>
+        </p:nvSpPr>
+        <p:spPr>
+          <a:xfrm>
+            <a:off x="1804171" y="4271945"/>
+            <a:ext cx="617216" cy="617216"/>
+          </a:xfrm>
+          <a:prstGeom prst="rect">
+            <a:avLst/>
+          </a:prstGeom>
+        </p:spPr>
+        <p:style>
+          <a:lnRef idx="2">
+            <a:schemeClr val="accent1"/>
+          </a:lnRef>
+          <a:fillRef idx="1">
+            <a:schemeClr val="lt1"/>
+          </a:fillRef>
+          <a:effectRef idx="0">
+            <a:schemeClr val="accent1"/>
+          </a:effectRef>
+          <a:fontRef idx="minor">
+            <a:schemeClr val="dk1"/>
+          </a:fontRef>
+        </p:style>
+        <p:txBody>
+          <a:bodyPr rtlCol="0" anchor="ctr"/>
+          <a:lstStyle/>
+          <a:p>
+            <a:pPr algn="ctr"/>
+            <a:r>
+              <a:rPr lang="en-US" sz="1600" dirty="0" smtClean="0"/>
+              <a:t>105</a:t>
+            </a:r>
+            <a:endParaRPr lang="en-US" sz="1600" dirty="0"/>
+          </a:p>
+        </p:txBody>
+      </p:sp>
+      <p:sp>
+        <p:nvSpPr>
+          <p:cNvPr id="36" name="Rectangle 35"/>
+          <p:cNvSpPr/>
+          <p:nvPr/>
+        </p:nvSpPr>
+        <p:spPr>
+          <a:xfrm>
+            <a:off x="2665561" y="4271945"/>
+            <a:ext cx="617216" cy="617216"/>
+          </a:xfrm>
+          <a:prstGeom prst="rect">
+            <a:avLst/>
+          </a:prstGeom>
+        </p:spPr>
+        <p:style>
+          <a:lnRef idx="2">
+            <a:schemeClr val="accent2"/>
+          </a:lnRef>
+          <a:fillRef idx="1">
+            <a:schemeClr val="lt1"/>
+          </a:fillRef>
+          <a:effectRef idx="0">
+            <a:schemeClr val="accent2"/>
+          </a:effectRef>
+          <a:fontRef idx="minor">
+            <a:schemeClr val="dk1"/>
+          </a:fontRef>
+        </p:style>
+        <p:txBody>
+          <a:bodyPr rtlCol="0" anchor="ctr"/>
+          <a:lstStyle/>
+          <a:p>
+            <a:pPr algn="ctr"/>
+            <a:r>
+              <a:rPr lang="en-US" sz="1600" dirty="0" smtClean="0"/>
+              <a:t>384</a:t>
+            </a:r>
+            <a:endParaRPr lang="en-US" sz="1600" dirty="0"/>
+          </a:p>
+        </p:txBody>
+      </p:sp>
+      <p:sp>
+        <p:nvSpPr>
+          <p:cNvPr id="38" name="Rectangle 37"/>
+          <p:cNvSpPr/>
+          <p:nvPr/>
+        </p:nvSpPr>
+        <p:spPr>
+          <a:xfrm>
+            <a:off x="1804171" y="5375558"/>
+            <a:ext cx="617216" cy="617216"/>
+          </a:xfrm>
+          <a:prstGeom prst="rect">
+            <a:avLst/>
+          </a:prstGeom>
+        </p:spPr>
+        <p:style>
+          <a:lnRef idx="2">
+            <a:schemeClr val="accent1"/>
+          </a:lnRef>
+          <a:fillRef idx="1">
+            <a:schemeClr val="lt1"/>
+          </a:fillRef>
+          <a:effectRef idx="0">
+            <a:schemeClr val="accent1"/>
+          </a:effectRef>
+          <a:fontRef idx="minor">
+            <a:schemeClr val="dk1"/>
+          </a:fontRef>
+        </p:style>
+        <p:txBody>
+          <a:bodyPr rtlCol="0" anchor="ctr"/>
+          <a:lstStyle/>
+          <a:p>
+            <a:pPr algn="ctr"/>
+            <a:r>
+              <a:rPr lang="en-US" sz="1200" dirty="0" smtClean="0"/>
+              <a:t>40320</a:t>
+            </a:r>
+            <a:endParaRPr lang="en-US" sz="1200" dirty="0"/>
+          </a:p>
+        </p:txBody>
+      </p:sp>
+      <p:sp>
+        <p:nvSpPr>
+          <p:cNvPr id="48" name="Rectangle 47"/>
+          <p:cNvSpPr/>
+          <p:nvPr/>
+        </p:nvSpPr>
+        <p:spPr>
+          <a:xfrm>
+            <a:off x="3526951" y="4279405"/>
+            <a:ext cx="617216" cy="617216"/>
+          </a:xfrm>
+          <a:prstGeom prst="rect">
+            <a:avLst/>
+          </a:prstGeom>
+          <a:ln>
+            <a:solidFill>
+              <a:srgbClr val="A6A6A6"/>
+            </a:solidFill>
+          </a:ln>
+        </p:spPr>
+        <p:style>
+          <a:lnRef idx="2">
+            <a:schemeClr val="dk1"/>
+          </a:lnRef>
+          <a:fillRef idx="1">
+            <a:schemeClr val="lt1"/>
+          </a:fillRef>
+          <a:effectRef idx="0">
+            <a:schemeClr val="dk1"/>
+          </a:effectRef>
+          <a:fontRef idx="minor">
+            <a:schemeClr val="dk1"/>
+          </a:fontRef>
+        </p:style>
+        <p:txBody>
+          <a:bodyPr rtlCol="0" anchor="ctr"/>
+          <a:lstStyle/>
+          <a:p>
+            <a:pPr algn="ctr"/>
+            <a:r>
+              <a:rPr lang="en-US" sz="1600" dirty="0" smtClean="0">
+                <a:solidFill>
+                  <a:srgbClr val="A6A6A6"/>
+                </a:solidFill>
+              </a:rPr>
+              <a:t>21</a:t>
+            </a:r>
+            <a:endParaRPr lang="en-US" sz="1600" dirty="0">
+              <a:solidFill>
+                <a:srgbClr val="A6A6A6"/>
+              </a:solidFill>
+            </a:endParaRPr>
+          </a:p>
+        </p:txBody>
+      </p:sp>
+      <p:sp>
+        <p:nvSpPr>
+          <p:cNvPr id="49" name="Rectangle 48"/>
+          <p:cNvSpPr/>
+          <p:nvPr/>
+        </p:nvSpPr>
+        <p:spPr>
+          <a:xfrm>
+            <a:off x="4388341" y="4279405"/>
+            <a:ext cx="617216" cy="617216"/>
+          </a:xfrm>
+          <a:prstGeom prst="rect">
+            <a:avLst/>
+          </a:prstGeom>
+          <a:ln>
+            <a:solidFill>
+              <a:srgbClr val="A6A6A6"/>
+            </a:solidFill>
+          </a:ln>
+        </p:spPr>
+        <p:style>
+          <a:lnRef idx="2">
+            <a:schemeClr val="dk1"/>
+          </a:lnRef>
+          <a:fillRef idx="1">
+            <a:schemeClr val="lt1"/>
+          </a:fillRef>
+          <a:effectRef idx="0">
+            <a:schemeClr val="dk1"/>
+          </a:effectRef>
+          <a:fontRef idx="minor">
+            <a:schemeClr val="dk1"/>
+          </a:fontRef>
+        </p:style>
+        <p:txBody>
+          <a:bodyPr rtlCol="0" anchor="ctr"/>
+          <a:lstStyle/>
+          <a:p>
+            <a:pPr algn="ctr"/>
+            <a:r>
+              <a:rPr lang="en-US" sz="1600" dirty="0" smtClean="0">
+                <a:solidFill>
+                  <a:srgbClr val="A6A6A6"/>
+                </a:solidFill>
+              </a:rPr>
+              <a:t>32</a:t>
+            </a:r>
+            <a:endParaRPr lang="en-US" sz="1600" dirty="0">
+              <a:solidFill>
+                <a:srgbClr val="A6A6A6"/>
+              </a:solidFill>
+            </a:endParaRPr>
+          </a:p>
+        </p:txBody>
+      </p:sp>
+      <p:sp>
+        <p:nvSpPr>
+          <p:cNvPr id="54" name="Rectangle 53"/>
+          <p:cNvSpPr/>
+          <p:nvPr/>
+        </p:nvSpPr>
+        <p:spPr>
+          <a:xfrm>
+            <a:off x="3526951" y="5386750"/>
+            <a:ext cx="617216" cy="617216"/>
+          </a:xfrm>
+          <a:prstGeom prst="rect">
+            <a:avLst/>
+          </a:prstGeom>
+          <a:ln>
+            <a:solidFill>
+              <a:srgbClr val="A6A6A6"/>
+            </a:solidFill>
+          </a:ln>
+        </p:spPr>
+        <p:style>
+          <a:lnRef idx="2">
+            <a:schemeClr val="dk1"/>
+          </a:lnRef>
+          <a:fillRef idx="1">
+            <a:schemeClr val="lt1"/>
+          </a:fillRef>
+          <a:effectRef idx="0">
+            <a:schemeClr val="dk1"/>
+          </a:effectRef>
+          <a:fontRef idx="minor">
+            <a:schemeClr val="dk1"/>
+          </a:fontRef>
+        </p:style>
+        <p:txBody>
+          <a:bodyPr rtlCol="0" anchor="ctr"/>
+          <a:lstStyle/>
+          <a:p>
+            <a:pPr algn="ctr"/>
+            <a:r>
+              <a:rPr lang="en-US" sz="1600" dirty="0" smtClean="0">
+                <a:solidFill>
+                  <a:srgbClr val="A6A6A6"/>
+                </a:solidFill>
+              </a:rPr>
+              <a:t>21</a:t>
+            </a:r>
+            <a:endParaRPr lang="en-US" sz="1600" dirty="0">
+              <a:solidFill>
+                <a:srgbClr val="A6A6A6"/>
+              </a:solidFill>
+            </a:endParaRPr>
+          </a:p>
+        </p:txBody>
+      </p:sp>
+      <p:sp>
+        <p:nvSpPr>
+          <p:cNvPr id="55" name="Rectangle 54"/>
+          <p:cNvSpPr/>
+          <p:nvPr/>
+        </p:nvSpPr>
+        <p:spPr>
+          <a:xfrm>
+            <a:off x="4388341" y="5386750"/>
+            <a:ext cx="617216" cy="617216"/>
+          </a:xfrm>
+          <a:prstGeom prst="rect">
+            <a:avLst/>
+          </a:prstGeom>
+          <a:ln>
+            <a:solidFill>
+              <a:srgbClr val="A6A6A6"/>
+            </a:solidFill>
+          </a:ln>
+        </p:spPr>
+        <p:style>
+          <a:lnRef idx="2">
+            <a:schemeClr val="dk1"/>
+          </a:lnRef>
+          <a:fillRef idx="1">
+            <a:schemeClr val="lt1"/>
+          </a:fillRef>
+          <a:effectRef idx="0">
+            <a:schemeClr val="dk1"/>
+          </a:effectRef>
+          <a:fontRef idx="minor">
+            <a:schemeClr val="dk1"/>
+          </a:fontRef>
+        </p:style>
+        <p:txBody>
+          <a:bodyPr rtlCol="0" anchor="ctr"/>
+          <a:lstStyle/>
+          <a:p>
+            <a:pPr algn="ctr"/>
+            <a:r>
+              <a:rPr lang="en-US" sz="1600" dirty="0" smtClean="0">
+                <a:solidFill>
+                  <a:srgbClr val="A6A6A6"/>
+                </a:solidFill>
+              </a:rPr>
+              <a:t>32</a:t>
+            </a:r>
+            <a:endParaRPr lang="en-US" sz="1600" dirty="0">
+              <a:solidFill>
+                <a:srgbClr val="A6A6A6"/>
+              </a:solidFill>
+            </a:endParaRPr>
+          </a:p>
+        </p:txBody>
+      </p:sp>
+      <p:sp>
+        <p:nvSpPr>
+          <p:cNvPr id="60" name="Rectangle 59"/>
+          <p:cNvSpPr/>
+          <p:nvPr/>
+        </p:nvSpPr>
+        <p:spPr>
+          <a:xfrm>
+            <a:off x="2665561" y="5375558"/>
+            <a:ext cx="617216" cy="617216"/>
+          </a:xfrm>
+          <a:prstGeom prst="rect">
+            <a:avLst/>
+          </a:prstGeom>
+          <a:ln>
+            <a:solidFill>
+              <a:srgbClr val="A6A6A6"/>
+            </a:solidFill>
+          </a:ln>
+        </p:spPr>
+        <p:style>
+          <a:lnRef idx="2">
+            <a:schemeClr val="dk1"/>
+          </a:lnRef>
+          <a:fillRef idx="1">
+            <a:schemeClr val="lt1"/>
+          </a:fillRef>
+          <a:effectRef idx="0">
+            <a:schemeClr val="dk1"/>
+          </a:effectRef>
+          <a:fontRef idx="minor">
+            <a:schemeClr val="dk1"/>
+          </a:fontRef>
+        </p:style>
+        <p:txBody>
+          <a:bodyPr rtlCol="0" anchor="ctr"/>
+          <a:lstStyle/>
+          <a:p>
+            <a:pPr algn="ctr"/>
+            <a:r>
+              <a:rPr lang="en-US" sz="1600" dirty="0" smtClean="0">
+                <a:solidFill>
+                  <a:srgbClr val="A6A6A6"/>
+                </a:solidFill>
+              </a:rPr>
+              <a:t>384</a:t>
+            </a:r>
+            <a:endParaRPr lang="en-US" sz="1600" dirty="0">
+              <a:solidFill>
+                <a:srgbClr val="A6A6A6"/>
+              </a:solidFill>
+            </a:endParaRPr>
+          </a:p>
+        </p:txBody>
+      </p:sp>
+      <p:sp>
+        <p:nvSpPr>
+          <p:cNvPr id="91" name="TextBox 90"/>
+          <p:cNvSpPr txBox="1"/>
+          <p:nvPr/>
+        </p:nvSpPr>
+        <p:spPr>
+          <a:xfrm>
+            <a:off x="795259" y="1417809"/>
+            <a:ext cx="941283" cy="369332"/>
+          </a:xfrm>
+          <a:prstGeom prst="rect">
+            <a:avLst/>
+          </a:prstGeom>
+          <a:noFill/>
+        </p:spPr>
+        <p:txBody>
+          <a:bodyPr wrap="none" rtlCol="0">
+            <a:spAutoFit/>
+          </a:bodyPr>
+          <a:lstStyle/>
+          <a:p>
+            <a:r>
+              <a:rPr lang="en-US" dirty="0" smtClean="0"/>
+              <a:t>Threads</a:t>
+            </a:r>
+            <a:endParaRPr lang="en-US" dirty="0"/>
+          </a:p>
+        </p:txBody>
+      </p:sp>
+      <p:sp>
+        <p:nvSpPr>
+          <p:cNvPr id="92" name="TextBox 91"/>
+          <p:cNvSpPr txBox="1"/>
+          <p:nvPr/>
+        </p:nvSpPr>
+        <p:spPr>
+          <a:xfrm>
+            <a:off x="1955599" y="1453420"/>
+            <a:ext cx="301660" cy="369332"/>
+          </a:xfrm>
+          <a:prstGeom prst="rect">
+            <a:avLst/>
+          </a:prstGeom>
+          <a:noFill/>
+        </p:spPr>
+        <p:txBody>
+          <a:bodyPr wrap="none" rtlCol="0">
+            <a:spAutoFit/>
+          </a:bodyPr>
+          <a:lstStyle/>
+          <a:p>
+            <a:r>
+              <a:rPr lang="en-US" dirty="0" smtClean="0"/>
+              <a:t>0</a:t>
+            </a:r>
+            <a:endParaRPr lang="en-US" dirty="0"/>
+          </a:p>
+        </p:txBody>
+      </p:sp>
+      <p:sp>
+        <p:nvSpPr>
+          <p:cNvPr id="93" name="TextBox 92"/>
+          <p:cNvSpPr txBox="1"/>
+          <p:nvPr/>
+        </p:nvSpPr>
+        <p:spPr>
+          <a:xfrm>
+            <a:off x="2823340" y="1453420"/>
+            <a:ext cx="301660" cy="369332"/>
+          </a:xfrm>
+          <a:prstGeom prst="rect">
+            <a:avLst/>
+          </a:prstGeom>
+          <a:noFill/>
+        </p:spPr>
+        <p:txBody>
+          <a:bodyPr wrap="none" rtlCol="0">
+            <a:spAutoFit/>
+          </a:bodyPr>
+          <a:lstStyle/>
+          <a:p>
+            <a:r>
+              <a:rPr lang="en-US" dirty="0" smtClean="0"/>
+              <a:t>1</a:t>
+            </a:r>
+            <a:endParaRPr lang="en-US" dirty="0"/>
+          </a:p>
+        </p:txBody>
+      </p:sp>
+      <p:sp>
+        <p:nvSpPr>
+          <p:cNvPr id="94" name="TextBox 93"/>
+          <p:cNvSpPr txBox="1"/>
+          <p:nvPr/>
+        </p:nvSpPr>
+        <p:spPr>
+          <a:xfrm>
+            <a:off x="3684729" y="1453420"/>
+            <a:ext cx="301660" cy="369332"/>
+          </a:xfrm>
+          <a:prstGeom prst="rect">
+            <a:avLst/>
+          </a:prstGeom>
+          <a:noFill/>
+        </p:spPr>
+        <p:txBody>
+          <a:bodyPr wrap="none" rtlCol="0">
+            <a:spAutoFit/>
+          </a:bodyPr>
+          <a:lstStyle/>
+          <a:p>
+            <a:r>
+              <a:rPr lang="en-US" dirty="0" smtClean="0"/>
+              <a:t>2</a:t>
+            </a:r>
+            <a:endParaRPr lang="en-US" dirty="0"/>
+          </a:p>
+        </p:txBody>
+      </p:sp>
+      <p:sp>
+        <p:nvSpPr>
+          <p:cNvPr id="95" name="TextBox 94"/>
+          <p:cNvSpPr txBox="1"/>
+          <p:nvPr/>
+        </p:nvSpPr>
+        <p:spPr>
+          <a:xfrm>
+            <a:off x="4551206" y="1453420"/>
+            <a:ext cx="301660" cy="369332"/>
+          </a:xfrm>
+          <a:prstGeom prst="rect">
+            <a:avLst/>
+          </a:prstGeom>
+          <a:noFill/>
+        </p:spPr>
+        <p:txBody>
+          <a:bodyPr wrap="none" rtlCol="0">
+            <a:spAutoFit/>
+          </a:bodyPr>
+          <a:lstStyle/>
+          <a:p>
+            <a:r>
+              <a:rPr lang="en-US" dirty="0"/>
+              <a:t>3</a:t>
+            </a:r>
+          </a:p>
+        </p:txBody>
+      </p:sp>
+      <p:cxnSp>
+        <p:nvCxnSpPr>
+          <p:cNvPr id="105" name="Straight Arrow Connector 104"/>
+          <p:cNvCxnSpPr>
+            <a:stCxn id="6" idx="2"/>
+            <a:endCxn id="14" idx="0"/>
+          </p:cNvCxnSpPr>
+          <p:nvPr/>
+        </p:nvCxnSpPr>
+        <p:spPr>
+          <a:xfrm>
+            <a:off x="2112779" y="2681933"/>
+            <a:ext cx="0" cy="486398"/>
+          </a:xfrm>
+          <a:prstGeom prst="straightConnector1">
+            <a:avLst/>
+          </a:prstGeom>
+          <a:ln>
+            <a:tailEnd type="arrow"/>
+          </a:ln>
+        </p:spPr>
+        <p:style>
+          <a:lnRef idx="2">
+            <a:schemeClr val="accent1"/>
+          </a:lnRef>
+          <a:fillRef idx="0">
+            <a:schemeClr val="accent1"/>
+          </a:fillRef>
+          <a:effectRef idx="1">
+            <a:schemeClr val="accent1"/>
+          </a:effectRef>
+          <a:fontRef idx="minor">
+            <a:schemeClr val="tx1"/>
+          </a:fontRef>
+        </p:style>
+      </p:cxnSp>
+      <p:cxnSp>
+        <p:nvCxnSpPr>
+          <p:cNvPr id="107" name="Straight Arrow Connector 106"/>
+          <p:cNvCxnSpPr>
+            <a:stCxn id="10" idx="2"/>
+            <a:endCxn id="14" idx="0"/>
+          </p:cNvCxnSpPr>
+          <p:nvPr/>
+        </p:nvCxnSpPr>
+        <p:spPr>
+          <a:xfrm flipH="1">
+            <a:off x="2112779" y="2681933"/>
+            <a:ext cx="3445560" cy="486398"/>
+          </a:xfrm>
+          <a:prstGeom prst="straightConnector1">
+            <a:avLst/>
+          </a:prstGeom>
+          <a:ln>
+            <a:tailEnd type="arrow"/>
+          </a:ln>
+        </p:spPr>
+        <p:style>
+          <a:lnRef idx="2">
+            <a:schemeClr val="accent1"/>
+          </a:lnRef>
+          <a:fillRef idx="0">
+            <a:schemeClr val="accent1"/>
+          </a:fillRef>
+          <a:effectRef idx="1">
+            <a:schemeClr val="accent1"/>
+          </a:effectRef>
+          <a:fontRef idx="minor">
+            <a:schemeClr val="tx1"/>
+          </a:fontRef>
+        </p:style>
+      </p:cxnSp>
+      <p:cxnSp>
+        <p:nvCxnSpPr>
+          <p:cNvPr id="109" name="Straight Arrow Connector 108"/>
+          <p:cNvCxnSpPr>
+            <a:stCxn id="14" idx="2"/>
+          </p:cNvCxnSpPr>
+          <p:nvPr/>
+        </p:nvCxnSpPr>
+        <p:spPr>
+          <a:xfrm flipH="1">
+            <a:off x="2106429" y="3785547"/>
+            <a:ext cx="6350" cy="486398"/>
+          </a:xfrm>
+          <a:prstGeom prst="straightConnector1">
+            <a:avLst/>
+          </a:prstGeom>
+          <a:ln>
+            <a:tailEnd type="arrow"/>
+          </a:ln>
+        </p:spPr>
+        <p:style>
+          <a:lnRef idx="2">
+            <a:schemeClr val="accent1"/>
+          </a:lnRef>
+          <a:fillRef idx="0">
+            <a:schemeClr val="accent1"/>
+          </a:fillRef>
+          <a:effectRef idx="1">
+            <a:schemeClr val="accent1"/>
+          </a:effectRef>
+          <a:fontRef idx="minor">
+            <a:schemeClr val="tx1"/>
+          </a:fontRef>
+        </p:style>
+      </p:cxnSp>
+      <p:cxnSp>
+        <p:nvCxnSpPr>
+          <p:cNvPr id="111" name="Straight Arrow Connector 110"/>
+          <p:cNvCxnSpPr>
+            <a:stCxn id="16" idx="2"/>
+            <a:endCxn id="35" idx="0"/>
+          </p:cNvCxnSpPr>
+          <p:nvPr/>
+        </p:nvCxnSpPr>
+        <p:spPr>
+          <a:xfrm flipH="1">
+            <a:off x="2112779" y="3789277"/>
+            <a:ext cx="1722780" cy="482668"/>
+          </a:xfrm>
+          <a:prstGeom prst="straightConnector1">
+            <a:avLst/>
+          </a:prstGeom>
+          <a:ln>
+            <a:tailEnd type="arrow"/>
+          </a:ln>
+        </p:spPr>
+        <p:style>
+          <a:lnRef idx="2">
+            <a:schemeClr val="accent1"/>
+          </a:lnRef>
+          <a:fillRef idx="0">
+            <a:schemeClr val="accent1"/>
+          </a:fillRef>
+          <a:effectRef idx="1">
+            <a:schemeClr val="accent1"/>
+          </a:effectRef>
+          <a:fontRef idx="minor">
+            <a:schemeClr val="tx1"/>
+          </a:fontRef>
+        </p:style>
+      </p:cxnSp>
+      <p:cxnSp>
+        <p:nvCxnSpPr>
+          <p:cNvPr id="114" name="Straight Arrow Connector 113"/>
+          <p:cNvCxnSpPr>
+            <a:stCxn id="35" idx="2"/>
+            <a:endCxn id="38" idx="0"/>
+          </p:cNvCxnSpPr>
+          <p:nvPr/>
+        </p:nvCxnSpPr>
+        <p:spPr>
+          <a:xfrm>
+            <a:off x="2112779" y="4889161"/>
+            <a:ext cx="0" cy="486397"/>
+          </a:xfrm>
+          <a:prstGeom prst="straightConnector1">
+            <a:avLst/>
+          </a:prstGeom>
+          <a:ln>
+            <a:tailEnd type="arrow"/>
+          </a:ln>
+        </p:spPr>
+        <p:style>
+          <a:lnRef idx="2">
+            <a:schemeClr val="accent1"/>
+          </a:lnRef>
+          <a:fillRef idx="0">
+            <a:schemeClr val="accent1"/>
+          </a:fillRef>
+          <a:effectRef idx="1">
+            <a:schemeClr val="accent1"/>
+          </a:effectRef>
+          <a:fontRef idx="minor">
+            <a:schemeClr val="tx1"/>
+          </a:fontRef>
+        </p:style>
+      </p:cxnSp>
+      <p:cxnSp>
+        <p:nvCxnSpPr>
+          <p:cNvPr id="116" name="Straight Arrow Connector 115"/>
+          <p:cNvCxnSpPr>
+            <a:stCxn id="36" idx="2"/>
+          </p:cNvCxnSpPr>
+          <p:nvPr/>
+        </p:nvCxnSpPr>
+        <p:spPr>
+          <a:xfrm flipH="1">
+            <a:off x="2112779" y="4889161"/>
+            <a:ext cx="861390" cy="486397"/>
+          </a:xfrm>
+          <a:prstGeom prst="straightConnector1">
+            <a:avLst/>
+          </a:prstGeom>
+          <a:ln>
+            <a:tailEnd type="arrow"/>
+          </a:ln>
+        </p:spPr>
+        <p:style>
+          <a:lnRef idx="2">
+            <a:schemeClr val="accent1"/>
+          </a:lnRef>
+          <a:fillRef idx="0">
+            <a:schemeClr val="accent1"/>
+          </a:fillRef>
+          <a:effectRef idx="1">
+            <a:schemeClr val="accent1"/>
+          </a:effectRef>
+          <a:fontRef idx="minor">
+            <a:schemeClr val="tx1"/>
+          </a:fontRef>
+        </p:style>
+      </p:cxnSp>
+      <p:cxnSp>
+        <p:nvCxnSpPr>
+          <p:cNvPr id="122" name="Straight Arrow Connector 121"/>
+          <p:cNvCxnSpPr>
+            <a:stCxn id="7" idx="2"/>
+            <a:endCxn id="15" idx="0"/>
+          </p:cNvCxnSpPr>
+          <p:nvPr/>
+        </p:nvCxnSpPr>
+        <p:spPr>
+          <a:xfrm>
+            <a:off x="2974169" y="2681933"/>
+            <a:ext cx="0" cy="486398"/>
+          </a:xfrm>
+          <a:prstGeom prst="straightConnector1">
+            <a:avLst/>
+          </a:prstGeom>
+          <a:ln>
+            <a:tailEnd type="arrow"/>
+          </a:ln>
+        </p:spPr>
+        <p:style>
+          <a:lnRef idx="2">
+            <a:schemeClr val="accent2"/>
+          </a:lnRef>
+          <a:fillRef idx="0">
+            <a:schemeClr val="accent2"/>
+          </a:fillRef>
+          <a:effectRef idx="1">
+            <a:schemeClr val="accent2"/>
+          </a:effectRef>
+          <a:fontRef idx="minor">
+            <a:schemeClr val="tx1"/>
+          </a:fontRef>
+        </p:style>
+      </p:cxnSp>
+      <p:cxnSp>
+        <p:nvCxnSpPr>
+          <p:cNvPr id="124" name="Straight Arrow Connector 123"/>
+          <p:cNvCxnSpPr>
+            <a:stCxn id="11" idx="2"/>
+          </p:cNvCxnSpPr>
+          <p:nvPr/>
+        </p:nvCxnSpPr>
+        <p:spPr>
+          <a:xfrm flipH="1">
+            <a:off x="2974169" y="2681933"/>
+            <a:ext cx="3445560" cy="486398"/>
+          </a:xfrm>
+          <a:prstGeom prst="straightConnector1">
+            <a:avLst/>
+          </a:prstGeom>
+          <a:ln>
+            <a:tailEnd type="arrow"/>
+          </a:ln>
+        </p:spPr>
+        <p:style>
+          <a:lnRef idx="2">
+            <a:schemeClr val="accent2"/>
+          </a:lnRef>
+          <a:fillRef idx="0">
+            <a:schemeClr val="accent2"/>
+          </a:fillRef>
+          <a:effectRef idx="1">
+            <a:schemeClr val="accent2"/>
+          </a:effectRef>
+          <a:fontRef idx="minor">
+            <a:schemeClr val="tx1"/>
+          </a:fontRef>
+        </p:style>
+      </p:cxnSp>
+      <p:cxnSp>
+        <p:nvCxnSpPr>
+          <p:cNvPr id="126" name="Straight Arrow Connector 125"/>
+          <p:cNvCxnSpPr>
+            <a:stCxn id="15" idx="2"/>
+            <a:endCxn id="36" idx="0"/>
+          </p:cNvCxnSpPr>
+          <p:nvPr/>
+        </p:nvCxnSpPr>
+        <p:spPr>
+          <a:xfrm>
+            <a:off x="2974169" y="3785547"/>
+            <a:ext cx="0" cy="486398"/>
+          </a:xfrm>
+          <a:prstGeom prst="straightConnector1">
+            <a:avLst/>
+          </a:prstGeom>
+          <a:ln>
+            <a:tailEnd type="arrow"/>
+          </a:ln>
+        </p:spPr>
+        <p:style>
+          <a:lnRef idx="2">
+            <a:schemeClr val="accent2"/>
+          </a:lnRef>
+          <a:fillRef idx="0">
+            <a:schemeClr val="accent2"/>
+          </a:fillRef>
+          <a:effectRef idx="1">
+            <a:schemeClr val="accent2"/>
+          </a:effectRef>
+          <a:fontRef idx="minor">
+            <a:schemeClr val="tx1"/>
+          </a:fontRef>
+        </p:style>
+      </p:cxnSp>
+      <p:cxnSp>
+        <p:nvCxnSpPr>
+          <p:cNvPr id="128" name="Straight Arrow Connector 127"/>
+          <p:cNvCxnSpPr>
+            <a:stCxn id="17" idx="2"/>
+            <a:endCxn id="36" idx="0"/>
+          </p:cNvCxnSpPr>
+          <p:nvPr/>
+        </p:nvCxnSpPr>
+        <p:spPr>
+          <a:xfrm flipH="1">
+            <a:off x="2974169" y="3789277"/>
+            <a:ext cx="1722780" cy="482668"/>
+          </a:xfrm>
+          <a:prstGeom prst="straightConnector1">
+            <a:avLst/>
+          </a:prstGeom>
+          <a:ln>
+            <a:tailEnd type="arrow"/>
+          </a:ln>
+        </p:spPr>
+        <p:style>
+          <a:lnRef idx="2">
+            <a:schemeClr val="accent2"/>
+          </a:lnRef>
+          <a:fillRef idx="0">
+            <a:schemeClr val="accent2"/>
+          </a:fillRef>
+          <a:effectRef idx="1">
+            <a:schemeClr val="accent2"/>
+          </a:effectRef>
+          <a:fontRef idx="minor">
+            <a:schemeClr val="tx1"/>
+          </a:fontRef>
+        </p:style>
+      </p:cxnSp>
+      <p:sp>
+        <p:nvSpPr>
+          <p:cNvPr id="129" name="Down Arrow 128"/>
+          <p:cNvSpPr/>
+          <p:nvPr/>
+        </p:nvSpPr>
+        <p:spPr>
+          <a:xfrm>
+            <a:off x="1186954" y="2255335"/>
+            <a:ext cx="178043" cy="3418614"/>
+          </a:xfrm>
+          <a:prstGeom prst="downArrow">
+            <a:avLst/>
+          </a:prstGeom>
+        </p:spPr>
+        <p:style>
+          <a:lnRef idx="1">
+            <a:schemeClr val="accent1"/>
+          </a:lnRef>
+          <a:fillRef idx="3">
+            <a:schemeClr val="accent1"/>
+          </a:fillRef>
+          <a:effectRef idx="2">
+            <a:schemeClr val="accent1"/>
+          </a:effectRef>
+          <a:fontRef idx="minor">
+            <a:schemeClr val="lt1"/>
+          </a:fontRef>
+        </p:style>
+        <p:txBody>
+          <a:bodyPr rtlCol="0" anchor="ctr"/>
+          <a:lstStyle/>
+          <a:p>
+            <a:pPr algn="ctr"/>
+            <a:endParaRPr lang="en-US"/>
+          </a:p>
+        </p:txBody>
+      </p:sp>
+      <p:sp>
+        <p:nvSpPr>
+          <p:cNvPr id="131" name="TextBox 130"/>
+          <p:cNvSpPr txBox="1"/>
+          <p:nvPr/>
+        </p:nvSpPr>
+        <p:spPr>
+          <a:xfrm>
+            <a:off x="84256" y="3678401"/>
+            <a:ext cx="1102698" cy="369332"/>
+          </a:xfrm>
+          <a:prstGeom prst="rect">
+            <a:avLst/>
+          </a:prstGeom>
+          <a:noFill/>
+        </p:spPr>
+        <p:txBody>
+          <a:bodyPr wrap="none" rtlCol="0">
+            <a:spAutoFit/>
+          </a:bodyPr>
+          <a:lstStyle/>
+          <a:p>
+            <a:r>
+              <a:rPr lang="en-US" dirty="0" smtClean="0"/>
+              <a:t>Execution</a:t>
+            </a:r>
+            <a:endParaRPr lang="en-US" dirty="0"/>
+          </a:p>
+        </p:txBody>
+      </p:sp>
+      <p:sp>
+        <p:nvSpPr>
+          <p:cNvPr id="132" name="TextBox 131"/>
+          <p:cNvSpPr txBox="1"/>
+          <p:nvPr/>
+        </p:nvSpPr>
+        <p:spPr>
+          <a:xfrm>
+            <a:off x="1269616" y="2670401"/>
+            <a:ext cx="522687" cy="369332"/>
+          </a:xfrm>
+          <a:prstGeom prst="rect">
+            <a:avLst/>
+          </a:prstGeom>
+          <a:noFill/>
+        </p:spPr>
+        <p:txBody>
+          <a:bodyPr wrap="none" rtlCol="0">
+            <a:spAutoFit/>
+          </a:bodyPr>
+          <a:lstStyle/>
+          <a:p>
+            <a:pPr algn="r"/>
+            <a:r>
+              <a:rPr lang="en-US" dirty="0" smtClean="0"/>
+              <a:t>S=4</a:t>
+            </a:r>
+            <a:endParaRPr lang="en-US" dirty="0"/>
+          </a:p>
+        </p:txBody>
+      </p:sp>
+      <p:sp>
+        <p:nvSpPr>
+          <p:cNvPr id="133" name="TextBox 132"/>
+          <p:cNvSpPr txBox="1"/>
+          <p:nvPr/>
+        </p:nvSpPr>
+        <p:spPr>
+          <a:xfrm>
+            <a:off x="1269616" y="3754488"/>
+            <a:ext cx="522687" cy="369332"/>
+          </a:xfrm>
+          <a:prstGeom prst="rect">
+            <a:avLst/>
+          </a:prstGeom>
+          <a:noFill/>
+        </p:spPr>
+        <p:txBody>
+          <a:bodyPr wrap="none" rtlCol="0">
+            <a:spAutoFit/>
+          </a:bodyPr>
+          <a:lstStyle/>
+          <a:p>
+            <a:pPr algn="r"/>
+            <a:r>
+              <a:rPr lang="en-US" dirty="0" smtClean="0"/>
+              <a:t>S=2</a:t>
+            </a:r>
+            <a:endParaRPr lang="en-US" dirty="0"/>
+          </a:p>
+        </p:txBody>
+      </p:sp>
+      <p:sp>
+        <p:nvSpPr>
+          <p:cNvPr id="134" name="TextBox 133"/>
+          <p:cNvSpPr txBox="1"/>
+          <p:nvPr/>
+        </p:nvSpPr>
+        <p:spPr>
+          <a:xfrm>
+            <a:off x="1269616" y="4858415"/>
+            <a:ext cx="522687" cy="369332"/>
+          </a:xfrm>
+          <a:prstGeom prst="rect">
+            <a:avLst/>
+          </a:prstGeom>
+          <a:noFill/>
+        </p:spPr>
+        <p:txBody>
+          <a:bodyPr wrap="none" rtlCol="0">
+            <a:spAutoFit/>
+          </a:bodyPr>
+          <a:lstStyle/>
+          <a:p>
+            <a:pPr algn="r"/>
+            <a:r>
+              <a:rPr lang="en-US" dirty="0" smtClean="0"/>
+              <a:t>S=1</a:t>
+            </a:r>
+            <a:endParaRPr lang="en-US" dirty="0"/>
+          </a:p>
+        </p:txBody>
+      </p:sp>
+      <p:sp>
+        <p:nvSpPr>
+          <p:cNvPr id="5" name="TextBox 4"/>
+          <p:cNvSpPr txBox="1"/>
+          <p:nvPr/>
+        </p:nvSpPr>
+        <p:spPr>
+          <a:xfrm>
+            <a:off x="6111121" y="1511456"/>
+            <a:ext cx="1646605" cy="369332"/>
+          </a:xfrm>
+          <a:prstGeom prst="rect">
+            <a:avLst/>
+          </a:prstGeom>
+          <a:noFill/>
+        </p:spPr>
+        <p:txBody>
+          <a:bodyPr wrap="none" rtlCol="0">
+            <a:spAutoFit/>
+          </a:bodyPr>
+          <a:lstStyle/>
+          <a:p>
+            <a:r>
+              <a:rPr lang="en-US" dirty="0" smtClean="0"/>
+              <a:t>Global Memory</a:t>
+            </a:r>
+            <a:endParaRPr lang="en-US" dirty="0"/>
+          </a:p>
+        </p:txBody>
+      </p:sp>
+      <p:sp>
+        <p:nvSpPr>
+          <p:cNvPr id="62" name="TextBox 61"/>
+          <p:cNvSpPr txBox="1"/>
+          <p:nvPr/>
+        </p:nvSpPr>
+        <p:spPr>
+          <a:xfrm>
+            <a:off x="5130874" y="3309069"/>
+            <a:ext cx="1697901" cy="369332"/>
+          </a:xfrm>
+          <a:prstGeom prst="rect">
+            <a:avLst/>
+          </a:prstGeom>
+          <a:noFill/>
+        </p:spPr>
+        <p:txBody>
+          <a:bodyPr wrap="none" rtlCol="0">
+            <a:spAutoFit/>
+          </a:bodyPr>
+          <a:lstStyle/>
+          <a:p>
+            <a:r>
+              <a:rPr lang="en-US" dirty="0" smtClean="0"/>
+              <a:t>Shared Memory</a:t>
+            </a:r>
+            <a:endParaRPr lang="en-US" dirty="0"/>
+          </a:p>
+        </p:txBody>
+      </p:sp>
+    </p:spTree>
+    <p:extLst>
+      <p:ext uri="{BB962C8B-B14F-4D97-AF65-F5344CB8AC3E}">
+        <p14:creationId xmlns:p14="http://schemas.microsoft.com/office/powerpoint/2010/main" val="3696867032"/>
+      </p:ext>
+    </p:extLst>
+  </p:cSld>
+  <p:clrMapOvr>
+    <a:masterClrMapping/>
+  </p:clrMapOvr>
+  <p:timing>
+    <p:tnLst>
+      <p:par>
+        <p:cTn xmlns:p14="http://schemas.microsoft.com/office/powerpoint/2010/main" id="1" dur="indefinite" restart="never" nodeType="tmRoot">
+          <p:childTnLst>
+            <p:seq concurrent="1" nextAc="seek">
+              <p:cTn id="2" dur="indefinite" nodeType="mainSeq">
+                <p:childTnLst>
+                  <p:par>
+                    <p:cTn id="3" fill="hold">
+                      <p:stCondLst>
+                        <p:cond delay="indefinite"/>
+                      </p:stCondLst>
+                      <p:childTnLst>
+                        <p:par>
+                          <p:cTn id="4" fill="hold">
+                            <p:stCondLst>
+                              <p:cond delay="0"/>
+                            </p:stCondLst>
+                            <p:childTnLst>
+                              <p:par>
+                                <p:cTn id="5" presetID="10" presetClass="entr" presetSubtype="0" fill="hold" nodeType="clickEffect">
+                                  <p:stCondLst>
+                                    <p:cond delay="0"/>
+                                  </p:stCondLst>
+                                  <p:childTnLst>
+                                    <p:set>
+                                      <p:cBhvr>
+                                        <p:cTn id="6" dur="1" fill="hold">
+                                          <p:stCondLst>
+                                            <p:cond delay="0"/>
+                                          </p:stCondLst>
+                                        </p:cTn>
+                                        <p:tgtEl>
+                                          <p:spTgt spid="105"/>
+                                        </p:tgtEl>
+                                        <p:attrNameLst>
+                                          <p:attrName>style.visibility</p:attrName>
+                                        </p:attrNameLst>
+                                      </p:cBhvr>
+                                      <p:to>
+                                        <p:strVal val="visible"/>
+                                      </p:to>
+                                    </p:set>
+                                    <p:animEffect transition="in" filter="fade">
+                                      <p:cBhvr>
+                                        <p:cTn id="7" dur="500"/>
+                                        <p:tgtEl>
+                                          <p:spTgt spid="105"/>
+                                        </p:tgtEl>
+                                      </p:cBhvr>
+                                    </p:animEffect>
+                                  </p:childTnLst>
+                                </p:cTn>
+                              </p:par>
+                              <p:par>
+                                <p:cTn id="8" presetID="10" presetClass="entr" presetSubtype="0" fill="hold" nodeType="withEffect">
+                                  <p:stCondLst>
+                                    <p:cond delay="0"/>
+                                  </p:stCondLst>
+                                  <p:childTnLst>
+                                    <p:set>
+                                      <p:cBhvr>
+                                        <p:cTn id="9" dur="1" fill="hold">
+                                          <p:stCondLst>
+                                            <p:cond delay="0"/>
+                                          </p:stCondLst>
+                                        </p:cTn>
+                                        <p:tgtEl>
+                                          <p:spTgt spid="107"/>
+                                        </p:tgtEl>
+                                        <p:attrNameLst>
+                                          <p:attrName>style.visibility</p:attrName>
+                                        </p:attrNameLst>
+                                      </p:cBhvr>
+                                      <p:to>
+                                        <p:strVal val="visible"/>
+                                      </p:to>
+                                    </p:set>
+                                    <p:animEffect transition="in" filter="fade">
+                                      <p:cBhvr>
+                                        <p:cTn id="10" dur="500"/>
+                                        <p:tgtEl>
+                                          <p:spTgt spid="107"/>
+                                        </p:tgtEl>
+                                      </p:cBhvr>
+                                    </p:animEffect>
+                                  </p:childTnLst>
+                                </p:cTn>
+                              </p:par>
+                              <p:par>
+                                <p:cTn id="11" presetID="10" presetClass="entr" presetSubtype="0" fill="hold" grpId="0" nodeType="withEffect">
+                                  <p:stCondLst>
+                                    <p:cond delay="0"/>
+                                  </p:stCondLst>
+                                  <p:childTnLst>
+                                    <p:set>
+                                      <p:cBhvr>
+                                        <p:cTn id="12" dur="1" fill="hold">
+                                          <p:stCondLst>
+                                            <p:cond delay="0"/>
+                                          </p:stCondLst>
+                                        </p:cTn>
+                                        <p:tgtEl>
+                                          <p:spTgt spid="14"/>
+                                        </p:tgtEl>
+                                        <p:attrNameLst>
+                                          <p:attrName>style.visibility</p:attrName>
+                                        </p:attrNameLst>
+                                      </p:cBhvr>
+                                      <p:to>
+                                        <p:strVal val="visible"/>
+                                      </p:to>
+                                    </p:set>
+                                    <p:animEffect transition="in" filter="fade">
+                                      <p:cBhvr>
+                                        <p:cTn id="13" dur="500"/>
+                                        <p:tgtEl>
+                                          <p:spTgt spid="14"/>
+                                        </p:tgtEl>
+                                      </p:cBhvr>
+                                    </p:animEffect>
+                                  </p:childTnLst>
+                                </p:cTn>
+                              </p:par>
+                            </p:childTnLst>
+                          </p:cTn>
+                        </p:par>
+                        <p:par>
+                          <p:cTn id="14" fill="hold">
+                            <p:stCondLst>
+                              <p:cond delay="500"/>
+                            </p:stCondLst>
+                            <p:childTnLst>
+                              <p:par>
+                                <p:cTn id="15" presetID="10" presetClass="entr" presetSubtype="0" fill="hold" nodeType="afterEffect">
+                                  <p:stCondLst>
+                                    <p:cond delay="0"/>
+                                  </p:stCondLst>
+                                  <p:childTnLst>
+                                    <p:set>
+                                      <p:cBhvr>
+                                        <p:cTn id="16" dur="1" fill="hold">
+                                          <p:stCondLst>
+                                            <p:cond delay="0"/>
+                                          </p:stCondLst>
+                                        </p:cTn>
+                                        <p:tgtEl>
+                                          <p:spTgt spid="122"/>
+                                        </p:tgtEl>
+                                        <p:attrNameLst>
+                                          <p:attrName>style.visibility</p:attrName>
+                                        </p:attrNameLst>
+                                      </p:cBhvr>
+                                      <p:to>
+                                        <p:strVal val="visible"/>
+                                      </p:to>
+                                    </p:set>
+                                    <p:animEffect transition="in" filter="fade">
+                                      <p:cBhvr>
+                                        <p:cTn id="17" dur="500"/>
+                                        <p:tgtEl>
+                                          <p:spTgt spid="122"/>
+                                        </p:tgtEl>
+                                      </p:cBhvr>
+                                    </p:animEffect>
+                                  </p:childTnLst>
+                                </p:cTn>
+                              </p:par>
+                              <p:par>
+                                <p:cTn id="18" presetID="10" presetClass="entr" presetSubtype="0" fill="hold" nodeType="withEffect">
+                                  <p:stCondLst>
+                                    <p:cond delay="0"/>
+                                  </p:stCondLst>
+                                  <p:childTnLst>
+                                    <p:set>
+                                      <p:cBhvr>
+                                        <p:cTn id="19" dur="1" fill="hold">
+                                          <p:stCondLst>
+                                            <p:cond delay="0"/>
+                                          </p:stCondLst>
+                                        </p:cTn>
+                                        <p:tgtEl>
+                                          <p:spTgt spid="124"/>
+                                        </p:tgtEl>
+                                        <p:attrNameLst>
+                                          <p:attrName>style.visibility</p:attrName>
+                                        </p:attrNameLst>
+                                      </p:cBhvr>
+                                      <p:to>
+                                        <p:strVal val="visible"/>
+                                      </p:to>
+                                    </p:set>
+                                    <p:animEffect transition="in" filter="fade">
+                                      <p:cBhvr>
+                                        <p:cTn id="20" dur="500"/>
+                                        <p:tgtEl>
+                                          <p:spTgt spid="124"/>
+                                        </p:tgtEl>
+                                      </p:cBhvr>
+                                    </p:animEffect>
+                                  </p:childTnLst>
+                                </p:cTn>
+                              </p:par>
+                              <p:par>
+                                <p:cTn id="21" presetID="10" presetClass="entr" presetSubtype="0" fill="hold" grpId="0" nodeType="withEffect">
+                                  <p:stCondLst>
+                                    <p:cond delay="0"/>
+                                  </p:stCondLst>
+                                  <p:childTnLst>
+                                    <p:set>
+                                      <p:cBhvr>
+                                        <p:cTn id="22" dur="1" fill="hold">
+                                          <p:stCondLst>
+                                            <p:cond delay="0"/>
+                                          </p:stCondLst>
+                                        </p:cTn>
+                                        <p:tgtEl>
+                                          <p:spTgt spid="15"/>
+                                        </p:tgtEl>
+                                        <p:attrNameLst>
+                                          <p:attrName>style.visibility</p:attrName>
+                                        </p:attrNameLst>
+                                      </p:cBhvr>
+                                      <p:to>
+                                        <p:strVal val="visible"/>
+                                      </p:to>
+                                    </p:set>
+                                    <p:animEffect transition="in" filter="fade">
+                                      <p:cBhvr>
+                                        <p:cTn id="23" dur="500"/>
+                                        <p:tgtEl>
+                                          <p:spTgt spid="15"/>
+                                        </p:tgtEl>
+                                      </p:cBhvr>
+                                    </p:animEffect>
+                                  </p:childTnLst>
+                                </p:cTn>
+                              </p:par>
+                            </p:childTnLst>
+                          </p:cTn>
+                        </p:par>
+                        <p:par>
+                          <p:cTn id="24" fill="hold">
+                            <p:stCondLst>
+                              <p:cond delay="1000"/>
+                            </p:stCondLst>
+                            <p:childTnLst>
+                              <p:par>
+                                <p:cTn id="25" presetID="10" presetClass="entr" presetSubtype="0" fill="hold" grpId="0" nodeType="afterEffect">
+                                  <p:stCondLst>
+                                    <p:cond delay="0"/>
+                                  </p:stCondLst>
+                                  <p:childTnLst>
+                                    <p:set>
+                                      <p:cBhvr>
+                                        <p:cTn id="26" dur="1" fill="hold">
+                                          <p:stCondLst>
+                                            <p:cond delay="0"/>
+                                          </p:stCondLst>
+                                        </p:cTn>
+                                        <p:tgtEl>
+                                          <p:spTgt spid="16"/>
+                                        </p:tgtEl>
+                                        <p:attrNameLst>
+                                          <p:attrName>style.visibility</p:attrName>
+                                        </p:attrNameLst>
+                                      </p:cBhvr>
+                                      <p:to>
+                                        <p:strVal val="visible"/>
+                                      </p:to>
+                                    </p:set>
+                                    <p:animEffect transition="in" filter="fade">
+                                      <p:cBhvr>
+                                        <p:cTn id="27" dur="500"/>
+                                        <p:tgtEl>
+                                          <p:spTgt spid="16"/>
+                                        </p:tgtEl>
+                                      </p:cBhvr>
+                                    </p:animEffect>
+                                  </p:childTnLst>
+                                </p:cTn>
+                              </p:par>
+                              <p:par>
+                                <p:cTn id="28" presetID="10" presetClass="entr" presetSubtype="0" fill="hold" grpId="0" nodeType="withEffect">
+                                  <p:stCondLst>
+                                    <p:cond delay="0"/>
+                                  </p:stCondLst>
+                                  <p:childTnLst>
+                                    <p:set>
+                                      <p:cBhvr>
+                                        <p:cTn id="29" dur="1" fill="hold">
+                                          <p:stCondLst>
+                                            <p:cond delay="0"/>
+                                          </p:stCondLst>
+                                        </p:cTn>
+                                        <p:tgtEl>
+                                          <p:spTgt spid="17"/>
+                                        </p:tgtEl>
+                                        <p:attrNameLst>
+                                          <p:attrName>style.visibility</p:attrName>
+                                        </p:attrNameLst>
+                                      </p:cBhvr>
+                                      <p:to>
+                                        <p:strVal val="visible"/>
+                                      </p:to>
+                                    </p:set>
+                                    <p:animEffect transition="in" filter="fade">
+                                      <p:cBhvr>
+                                        <p:cTn id="30" dur="500"/>
+                                        <p:tgtEl>
+                                          <p:spTgt spid="17"/>
+                                        </p:tgtEl>
+                                      </p:cBhvr>
+                                    </p:animEffect>
+                                  </p:childTnLst>
+                                </p:cTn>
+                              </p:par>
+                            </p:childTnLst>
+                          </p:cTn>
+                        </p:par>
+                      </p:childTnLst>
+                    </p:cTn>
+                  </p:par>
+                  <p:par>
+                    <p:cTn id="31" fill="hold">
+                      <p:stCondLst>
+                        <p:cond delay="indefinite"/>
+                      </p:stCondLst>
+                      <p:childTnLst>
+                        <p:par>
+                          <p:cTn id="32" fill="hold">
+                            <p:stCondLst>
+                              <p:cond delay="0"/>
+                            </p:stCondLst>
+                            <p:childTnLst>
+                              <p:par>
+                                <p:cTn id="33" presetID="10" presetClass="entr" presetSubtype="0" fill="hold" nodeType="clickEffect">
+                                  <p:stCondLst>
+                                    <p:cond delay="0"/>
+                                  </p:stCondLst>
+                                  <p:childTnLst>
+                                    <p:set>
+                                      <p:cBhvr>
+                                        <p:cTn id="34" dur="1" fill="hold">
+                                          <p:stCondLst>
+                                            <p:cond delay="0"/>
+                                          </p:stCondLst>
+                                        </p:cTn>
+                                        <p:tgtEl>
+                                          <p:spTgt spid="109"/>
+                                        </p:tgtEl>
+                                        <p:attrNameLst>
+                                          <p:attrName>style.visibility</p:attrName>
+                                        </p:attrNameLst>
+                                      </p:cBhvr>
+                                      <p:to>
+                                        <p:strVal val="visible"/>
+                                      </p:to>
+                                    </p:set>
+                                    <p:animEffect transition="in" filter="fade">
+                                      <p:cBhvr>
+                                        <p:cTn id="35" dur="500"/>
+                                        <p:tgtEl>
+                                          <p:spTgt spid="109"/>
+                                        </p:tgtEl>
+                                      </p:cBhvr>
+                                    </p:animEffect>
+                                  </p:childTnLst>
+                                </p:cTn>
+                              </p:par>
+                              <p:par>
+                                <p:cTn id="36" presetID="10" presetClass="entr" presetSubtype="0" fill="hold" nodeType="withEffect">
+                                  <p:stCondLst>
+                                    <p:cond delay="0"/>
+                                  </p:stCondLst>
+                                  <p:childTnLst>
+                                    <p:set>
+                                      <p:cBhvr>
+                                        <p:cTn id="37" dur="1" fill="hold">
+                                          <p:stCondLst>
+                                            <p:cond delay="0"/>
+                                          </p:stCondLst>
+                                        </p:cTn>
+                                        <p:tgtEl>
+                                          <p:spTgt spid="111"/>
+                                        </p:tgtEl>
+                                        <p:attrNameLst>
+                                          <p:attrName>style.visibility</p:attrName>
+                                        </p:attrNameLst>
+                                      </p:cBhvr>
+                                      <p:to>
+                                        <p:strVal val="visible"/>
+                                      </p:to>
+                                    </p:set>
+                                    <p:animEffect transition="in" filter="fade">
+                                      <p:cBhvr>
+                                        <p:cTn id="38" dur="500"/>
+                                        <p:tgtEl>
+                                          <p:spTgt spid="111"/>
+                                        </p:tgtEl>
+                                      </p:cBhvr>
+                                    </p:animEffect>
+                                  </p:childTnLst>
+                                </p:cTn>
+                              </p:par>
+                              <p:par>
+                                <p:cTn id="39" presetID="10" presetClass="entr" presetSubtype="0" fill="hold" grpId="0" nodeType="withEffect">
+                                  <p:stCondLst>
+                                    <p:cond delay="0"/>
+                                  </p:stCondLst>
+                                  <p:childTnLst>
+                                    <p:set>
+                                      <p:cBhvr>
+                                        <p:cTn id="40" dur="1" fill="hold">
+                                          <p:stCondLst>
+                                            <p:cond delay="0"/>
+                                          </p:stCondLst>
+                                        </p:cTn>
+                                        <p:tgtEl>
+                                          <p:spTgt spid="35"/>
+                                        </p:tgtEl>
+                                        <p:attrNameLst>
+                                          <p:attrName>style.visibility</p:attrName>
+                                        </p:attrNameLst>
+                                      </p:cBhvr>
+                                      <p:to>
+                                        <p:strVal val="visible"/>
+                                      </p:to>
+                                    </p:set>
+                                    <p:animEffect transition="in" filter="fade">
+                                      <p:cBhvr>
+                                        <p:cTn id="41" dur="500"/>
+                                        <p:tgtEl>
+                                          <p:spTgt spid="35"/>
+                                        </p:tgtEl>
+                                      </p:cBhvr>
+                                    </p:animEffect>
+                                  </p:childTnLst>
+                                </p:cTn>
+                              </p:par>
+                              <p:par>
+                                <p:cTn id="42" presetID="10" presetClass="entr" presetSubtype="0" fill="hold" nodeType="withEffect">
+                                  <p:stCondLst>
+                                    <p:cond delay="0"/>
+                                  </p:stCondLst>
+                                  <p:childTnLst>
+                                    <p:set>
+                                      <p:cBhvr>
+                                        <p:cTn id="43" dur="1" fill="hold">
+                                          <p:stCondLst>
+                                            <p:cond delay="0"/>
+                                          </p:stCondLst>
+                                        </p:cTn>
+                                        <p:tgtEl>
+                                          <p:spTgt spid="126"/>
+                                        </p:tgtEl>
+                                        <p:attrNameLst>
+                                          <p:attrName>style.visibility</p:attrName>
+                                        </p:attrNameLst>
+                                      </p:cBhvr>
+                                      <p:to>
+                                        <p:strVal val="visible"/>
+                                      </p:to>
+                                    </p:set>
+                                    <p:animEffect transition="in" filter="fade">
+                                      <p:cBhvr>
+                                        <p:cTn id="44" dur="500"/>
+                                        <p:tgtEl>
+                                          <p:spTgt spid="126"/>
+                                        </p:tgtEl>
+                                      </p:cBhvr>
+                                    </p:animEffect>
+                                  </p:childTnLst>
+                                </p:cTn>
+                              </p:par>
+                              <p:par>
+                                <p:cTn id="45" presetID="10" presetClass="entr" presetSubtype="0" fill="hold" nodeType="withEffect">
+                                  <p:stCondLst>
+                                    <p:cond delay="0"/>
+                                  </p:stCondLst>
+                                  <p:childTnLst>
+                                    <p:set>
+                                      <p:cBhvr>
+                                        <p:cTn id="46" dur="1" fill="hold">
+                                          <p:stCondLst>
+                                            <p:cond delay="0"/>
+                                          </p:stCondLst>
+                                        </p:cTn>
+                                        <p:tgtEl>
+                                          <p:spTgt spid="128"/>
+                                        </p:tgtEl>
+                                        <p:attrNameLst>
+                                          <p:attrName>style.visibility</p:attrName>
+                                        </p:attrNameLst>
+                                      </p:cBhvr>
+                                      <p:to>
+                                        <p:strVal val="visible"/>
+                                      </p:to>
+                                    </p:set>
+                                    <p:animEffect transition="in" filter="fade">
+                                      <p:cBhvr>
+                                        <p:cTn id="47" dur="500"/>
+                                        <p:tgtEl>
+                                          <p:spTgt spid="128"/>
+                                        </p:tgtEl>
+                                      </p:cBhvr>
+                                    </p:animEffect>
+                                  </p:childTnLst>
+                                </p:cTn>
+                              </p:par>
+                              <p:par>
+                                <p:cTn id="48" presetID="10" presetClass="entr" presetSubtype="0" fill="hold" grpId="0" nodeType="withEffect">
+                                  <p:stCondLst>
+                                    <p:cond delay="0"/>
+                                  </p:stCondLst>
+                                  <p:childTnLst>
+                                    <p:set>
+                                      <p:cBhvr>
+                                        <p:cTn id="49" dur="1" fill="hold">
+                                          <p:stCondLst>
+                                            <p:cond delay="0"/>
+                                          </p:stCondLst>
+                                        </p:cTn>
+                                        <p:tgtEl>
+                                          <p:spTgt spid="36"/>
+                                        </p:tgtEl>
+                                        <p:attrNameLst>
+                                          <p:attrName>style.visibility</p:attrName>
+                                        </p:attrNameLst>
+                                      </p:cBhvr>
+                                      <p:to>
+                                        <p:strVal val="visible"/>
+                                      </p:to>
+                                    </p:set>
+                                    <p:animEffect transition="in" filter="fade">
+                                      <p:cBhvr>
+                                        <p:cTn id="50" dur="500"/>
+                                        <p:tgtEl>
+                                          <p:spTgt spid="36"/>
+                                        </p:tgtEl>
+                                      </p:cBhvr>
+                                    </p:animEffect>
+                                  </p:childTnLst>
+                                </p:cTn>
+                              </p:par>
+                              <p:par>
+                                <p:cTn id="51" presetID="10" presetClass="entr" presetSubtype="0" fill="hold" grpId="0" nodeType="withEffect">
+                                  <p:stCondLst>
+                                    <p:cond delay="0"/>
+                                  </p:stCondLst>
+                                  <p:childTnLst>
+                                    <p:set>
+                                      <p:cBhvr>
+                                        <p:cTn id="52" dur="1" fill="hold">
+                                          <p:stCondLst>
+                                            <p:cond delay="0"/>
+                                          </p:stCondLst>
+                                        </p:cTn>
+                                        <p:tgtEl>
+                                          <p:spTgt spid="48"/>
+                                        </p:tgtEl>
+                                        <p:attrNameLst>
+                                          <p:attrName>style.visibility</p:attrName>
+                                        </p:attrNameLst>
+                                      </p:cBhvr>
+                                      <p:to>
+                                        <p:strVal val="visible"/>
+                                      </p:to>
+                                    </p:set>
+                                    <p:animEffect transition="in" filter="fade">
+                                      <p:cBhvr>
+                                        <p:cTn id="53" dur="500"/>
+                                        <p:tgtEl>
+                                          <p:spTgt spid="48"/>
+                                        </p:tgtEl>
+                                      </p:cBhvr>
+                                    </p:animEffect>
+                                  </p:childTnLst>
+                                </p:cTn>
+                              </p:par>
+                              <p:par>
+                                <p:cTn id="54" presetID="10" presetClass="entr" presetSubtype="0" fill="hold" grpId="0" nodeType="withEffect">
+                                  <p:stCondLst>
+                                    <p:cond delay="0"/>
+                                  </p:stCondLst>
+                                  <p:childTnLst>
+                                    <p:set>
+                                      <p:cBhvr>
+                                        <p:cTn id="55" dur="1" fill="hold">
+                                          <p:stCondLst>
+                                            <p:cond delay="0"/>
+                                          </p:stCondLst>
+                                        </p:cTn>
+                                        <p:tgtEl>
+                                          <p:spTgt spid="49"/>
+                                        </p:tgtEl>
+                                        <p:attrNameLst>
+                                          <p:attrName>style.visibility</p:attrName>
+                                        </p:attrNameLst>
+                                      </p:cBhvr>
+                                      <p:to>
+                                        <p:strVal val="visible"/>
+                                      </p:to>
+                                    </p:set>
+                                    <p:animEffect transition="in" filter="fade">
+                                      <p:cBhvr>
+                                        <p:cTn id="56" dur="500"/>
+                                        <p:tgtEl>
+                                          <p:spTgt spid="49"/>
+                                        </p:tgtEl>
+                                      </p:cBhvr>
+                                    </p:animEffect>
+                                  </p:childTnLst>
+                                </p:cTn>
+                              </p:par>
+                            </p:childTnLst>
+                          </p:cTn>
+                        </p:par>
+                      </p:childTnLst>
+                    </p:cTn>
+                  </p:par>
+                  <p:par>
+                    <p:cTn id="57" fill="hold">
+                      <p:stCondLst>
+                        <p:cond delay="indefinite"/>
+                      </p:stCondLst>
+                      <p:childTnLst>
+                        <p:par>
+                          <p:cTn id="58" fill="hold">
+                            <p:stCondLst>
+                              <p:cond delay="0"/>
+                            </p:stCondLst>
+                            <p:childTnLst>
+                              <p:par>
+                                <p:cTn id="59" presetID="10" presetClass="entr" presetSubtype="0" fill="hold" nodeType="clickEffect">
+                                  <p:stCondLst>
+                                    <p:cond delay="0"/>
+                                  </p:stCondLst>
+                                  <p:childTnLst>
+                                    <p:set>
+                                      <p:cBhvr>
+                                        <p:cTn id="60" dur="1" fill="hold">
+                                          <p:stCondLst>
+                                            <p:cond delay="0"/>
+                                          </p:stCondLst>
+                                        </p:cTn>
+                                        <p:tgtEl>
+                                          <p:spTgt spid="114"/>
+                                        </p:tgtEl>
+                                        <p:attrNameLst>
+                                          <p:attrName>style.visibility</p:attrName>
+                                        </p:attrNameLst>
+                                      </p:cBhvr>
+                                      <p:to>
+                                        <p:strVal val="visible"/>
+                                      </p:to>
+                                    </p:set>
+                                    <p:animEffect transition="in" filter="fade">
+                                      <p:cBhvr>
+                                        <p:cTn id="61" dur="500"/>
+                                        <p:tgtEl>
+                                          <p:spTgt spid="114"/>
+                                        </p:tgtEl>
+                                      </p:cBhvr>
+                                    </p:animEffect>
+                                  </p:childTnLst>
+                                </p:cTn>
+                              </p:par>
+                              <p:par>
+                                <p:cTn id="62" presetID="10" presetClass="entr" presetSubtype="0" fill="hold" nodeType="withEffect">
+                                  <p:stCondLst>
+                                    <p:cond delay="0"/>
+                                  </p:stCondLst>
+                                  <p:childTnLst>
+                                    <p:set>
+                                      <p:cBhvr>
+                                        <p:cTn id="63" dur="1" fill="hold">
+                                          <p:stCondLst>
+                                            <p:cond delay="0"/>
+                                          </p:stCondLst>
+                                        </p:cTn>
+                                        <p:tgtEl>
+                                          <p:spTgt spid="116"/>
+                                        </p:tgtEl>
+                                        <p:attrNameLst>
+                                          <p:attrName>style.visibility</p:attrName>
+                                        </p:attrNameLst>
+                                      </p:cBhvr>
+                                      <p:to>
+                                        <p:strVal val="visible"/>
+                                      </p:to>
+                                    </p:set>
+                                    <p:animEffect transition="in" filter="fade">
+                                      <p:cBhvr>
+                                        <p:cTn id="64" dur="500"/>
+                                        <p:tgtEl>
+                                          <p:spTgt spid="116"/>
+                                        </p:tgtEl>
+                                      </p:cBhvr>
+                                    </p:animEffect>
+                                  </p:childTnLst>
+                                </p:cTn>
+                              </p:par>
+                              <p:par>
+                                <p:cTn id="65" presetID="10" presetClass="entr" presetSubtype="0" fill="hold" grpId="0" nodeType="withEffect">
+                                  <p:stCondLst>
+                                    <p:cond delay="0"/>
+                                  </p:stCondLst>
+                                  <p:childTnLst>
+                                    <p:set>
+                                      <p:cBhvr>
+                                        <p:cTn id="66" dur="1" fill="hold">
+                                          <p:stCondLst>
+                                            <p:cond delay="0"/>
+                                          </p:stCondLst>
+                                        </p:cTn>
+                                        <p:tgtEl>
+                                          <p:spTgt spid="38"/>
+                                        </p:tgtEl>
+                                        <p:attrNameLst>
+                                          <p:attrName>style.visibility</p:attrName>
+                                        </p:attrNameLst>
+                                      </p:cBhvr>
+                                      <p:to>
+                                        <p:strVal val="visible"/>
+                                      </p:to>
+                                    </p:set>
+                                    <p:animEffect transition="in" filter="fade">
+                                      <p:cBhvr>
+                                        <p:cTn id="67" dur="500"/>
+                                        <p:tgtEl>
+                                          <p:spTgt spid="38"/>
+                                        </p:tgtEl>
+                                      </p:cBhvr>
+                                    </p:animEffect>
+                                  </p:childTnLst>
+                                </p:cTn>
+                              </p:par>
+                              <p:par>
+                                <p:cTn id="68" presetID="10" presetClass="entr" presetSubtype="0" fill="hold" grpId="0" nodeType="withEffect">
+                                  <p:stCondLst>
+                                    <p:cond delay="0"/>
+                                  </p:stCondLst>
+                                  <p:childTnLst>
+                                    <p:set>
+                                      <p:cBhvr>
+                                        <p:cTn id="69" dur="1" fill="hold">
+                                          <p:stCondLst>
+                                            <p:cond delay="0"/>
+                                          </p:stCondLst>
+                                        </p:cTn>
+                                        <p:tgtEl>
+                                          <p:spTgt spid="60"/>
+                                        </p:tgtEl>
+                                        <p:attrNameLst>
+                                          <p:attrName>style.visibility</p:attrName>
+                                        </p:attrNameLst>
+                                      </p:cBhvr>
+                                      <p:to>
+                                        <p:strVal val="visible"/>
+                                      </p:to>
+                                    </p:set>
+                                    <p:animEffect transition="in" filter="fade">
+                                      <p:cBhvr>
+                                        <p:cTn id="70" dur="500"/>
+                                        <p:tgtEl>
+                                          <p:spTgt spid="60"/>
+                                        </p:tgtEl>
+                                      </p:cBhvr>
+                                    </p:animEffect>
+                                  </p:childTnLst>
+                                </p:cTn>
+                              </p:par>
+                              <p:par>
+                                <p:cTn id="71" presetID="10" presetClass="entr" presetSubtype="0" fill="hold" grpId="0" nodeType="withEffect">
+                                  <p:stCondLst>
+                                    <p:cond delay="0"/>
+                                  </p:stCondLst>
+                                  <p:childTnLst>
+                                    <p:set>
+                                      <p:cBhvr>
+                                        <p:cTn id="72" dur="1" fill="hold">
+                                          <p:stCondLst>
+                                            <p:cond delay="0"/>
+                                          </p:stCondLst>
+                                        </p:cTn>
+                                        <p:tgtEl>
+                                          <p:spTgt spid="54"/>
+                                        </p:tgtEl>
+                                        <p:attrNameLst>
+                                          <p:attrName>style.visibility</p:attrName>
+                                        </p:attrNameLst>
+                                      </p:cBhvr>
+                                      <p:to>
+                                        <p:strVal val="visible"/>
+                                      </p:to>
+                                    </p:set>
+                                    <p:animEffect transition="in" filter="fade">
+                                      <p:cBhvr>
+                                        <p:cTn id="73" dur="500"/>
+                                        <p:tgtEl>
+                                          <p:spTgt spid="54"/>
+                                        </p:tgtEl>
+                                      </p:cBhvr>
+                                    </p:animEffect>
+                                  </p:childTnLst>
+                                </p:cTn>
+                              </p:par>
+                              <p:par>
+                                <p:cTn id="74" presetID="10" presetClass="entr" presetSubtype="0" fill="hold" grpId="0" nodeType="withEffect">
+                                  <p:stCondLst>
+                                    <p:cond delay="0"/>
+                                  </p:stCondLst>
+                                  <p:childTnLst>
+                                    <p:set>
+                                      <p:cBhvr>
+                                        <p:cTn id="75" dur="1" fill="hold">
+                                          <p:stCondLst>
+                                            <p:cond delay="0"/>
+                                          </p:stCondLst>
+                                        </p:cTn>
+                                        <p:tgtEl>
+                                          <p:spTgt spid="55"/>
+                                        </p:tgtEl>
+                                        <p:attrNameLst>
+                                          <p:attrName>style.visibility</p:attrName>
+                                        </p:attrNameLst>
+                                      </p:cBhvr>
+                                      <p:to>
+                                        <p:strVal val="visible"/>
+                                      </p:to>
+                                    </p:set>
+                                    <p:animEffect transition="in" filter="fade">
+                                      <p:cBhvr>
+                                        <p:cTn id="76" dur="500"/>
+                                        <p:tgtEl>
+                                          <p:spTgt spid="55"/>
+                                        </p:tgtEl>
+                                      </p:cBhvr>
+                                    </p:animEffect>
+                                  </p:childTnLst>
+                                </p:cTn>
+                              </p:par>
+                            </p:childTnLst>
+                          </p:cTn>
+                        </p:par>
+                      </p:childTnLst>
+                    </p:cTn>
+                  </p:par>
+                </p:childTnLst>
+              </p:cTn>
+              <p:prevCondLst>
+                <p:cond evt="onPrev" delay="0">
+                  <p:tgtEl>
+                    <p:sldTgt/>
+                  </p:tgtEl>
+                </p:cond>
+              </p:prevCondLst>
+              <p:nextCondLst>
+                <p:cond evt="onNext" delay="0">
+                  <p:tgtEl>
+                    <p:sldTgt/>
+                  </p:tgtEl>
+                </p:cond>
+              </p:nextCondLst>
+            </p:seq>
+          </p:childTnLst>
+        </p:cTn>
+      </p:par>
+    </p:tnLst>
+    <p:bldLst>
+      <p:bldP spid="14" grpId="0" animBg="1"/>
+      <p:bldP spid="15" grpId="0" animBg="1"/>
+      <p:bldP spid="16" grpId="0" animBg="1"/>
+      <p:bldP spid="17" grpId="0" animBg="1"/>
+      <p:bldP spid="35" grpId="0" animBg="1"/>
+      <p:bldP spid="36" grpId="0" animBg="1"/>
+      <p:bldP spid="38" grpId="0" animBg="1"/>
+      <p:bldP spid="48" grpId="0" animBg="1"/>
+      <p:bldP spid="49" grpId="0" animBg="1"/>
+      <p:bldP spid="54" grpId="0" animBg="1"/>
+      <p:bldP spid="55" grpId="0" animBg="1"/>
+      <p:bldP spid="60" grpId="0" animBg="1"/>
+    </p:bldLst>
+  </p:timing>
 </p:sld>
 </file>
 

</xml_diff>